<commit_message>
update installation, documentation, and images
</commit_message>
<xml_diff>
--- a/_site/assets/interfaces.pptx
+++ b/_site/assets/interfaces.pptx
@@ -2,12 +2,13 @@
 <file path=ppt/presentation.xml><?xml version="1.0" encoding="utf-8"?>
 <p:presentation xmlns:a="http://schemas.openxmlformats.org/drawingml/2006/main" xmlns:r="http://schemas.openxmlformats.org/officeDocument/2006/relationships" xmlns:p="http://schemas.openxmlformats.org/presentationml/2006/main" saveSubsetFonts="1" autoCompressPictures="0">
   <p:sldMasterIdLst>
-    <p:sldMasterId id="2147483660" r:id="rId1"/>
+    <p:sldMasterId id="2147483672" r:id="rId1"/>
   </p:sldMasterIdLst>
   <p:sldIdLst>
     <p:sldId id="256" r:id="rId2"/>
+    <p:sldId id="257" r:id="rId3"/>
   </p:sldIdLst>
-  <p:sldSz cx="9144000" cy="6858000" type="screen4x3"/>
+  <p:sldSz cx="9144000" cy="5715000" type="screen16x10"/>
   <p:notesSz cx="6858000" cy="9144000"/>
   <p:defaultTextStyle>
     <a:defPPr>
@@ -141,15 +142,15 @@
         </p:nvSpPr>
         <p:spPr>
           <a:xfrm>
-            <a:off x="685800" y="1122363"/>
-            <a:ext cx="7772400" cy="2387600"/>
+            <a:off x="1143000" y="935302"/>
+            <a:ext cx="6858000" cy="1989667"/>
           </a:xfrm>
         </p:spPr>
         <p:txBody>
           <a:bodyPr anchor="b"/>
           <a:lstStyle>
             <a:lvl1pPr algn="ctr">
-              <a:defRPr sz="6000"/>
+              <a:defRPr sz="4500"/>
             </a:lvl1pPr>
           </a:lstStyle>
           <a:p>
@@ -173,8 +174,8 @@
         </p:nvSpPr>
         <p:spPr>
           <a:xfrm>
-            <a:off x="1143000" y="3602038"/>
-            <a:ext cx="6858000" cy="1655762"/>
+            <a:off x="1143000" y="3001698"/>
+            <a:ext cx="6858000" cy="1379802"/>
           </a:xfrm>
         </p:spPr>
         <p:txBody>
@@ -182,39 +183,39 @@
           <a:lstStyle>
             <a:lvl1pPr marL="0" indent="0" algn="ctr">
               <a:buNone/>
-              <a:defRPr sz="2400"/>
+              <a:defRPr sz="1800"/>
             </a:lvl1pPr>
-            <a:lvl2pPr marL="457200" indent="0" algn="ctr">
-              <a:buNone/>
-              <a:defRPr sz="2000"/>
+            <a:lvl2pPr marL="342900" indent="0" algn="ctr">
+              <a:buNone/>
+              <a:defRPr sz="1500"/>
             </a:lvl2pPr>
-            <a:lvl3pPr marL="914400" indent="0" algn="ctr">
-              <a:buNone/>
-              <a:defRPr sz="1800"/>
+            <a:lvl3pPr marL="685800" indent="0" algn="ctr">
+              <a:buNone/>
+              <a:defRPr sz="1350"/>
             </a:lvl3pPr>
-            <a:lvl4pPr marL="1371600" indent="0" algn="ctr">
-              <a:buNone/>
-              <a:defRPr sz="1600"/>
+            <a:lvl4pPr marL="1028700" indent="0" algn="ctr">
+              <a:buNone/>
+              <a:defRPr sz="1200"/>
             </a:lvl4pPr>
-            <a:lvl5pPr marL="1828800" indent="0" algn="ctr">
-              <a:buNone/>
-              <a:defRPr sz="1600"/>
+            <a:lvl5pPr marL="1371600" indent="0" algn="ctr">
+              <a:buNone/>
+              <a:defRPr sz="1200"/>
             </a:lvl5pPr>
-            <a:lvl6pPr marL="2286000" indent="0" algn="ctr">
-              <a:buNone/>
-              <a:defRPr sz="1600"/>
+            <a:lvl6pPr marL="1714500" indent="0" algn="ctr">
+              <a:buNone/>
+              <a:defRPr sz="1200"/>
             </a:lvl6pPr>
-            <a:lvl7pPr marL="2743200" indent="0" algn="ctr">
-              <a:buNone/>
-              <a:defRPr sz="1600"/>
+            <a:lvl7pPr marL="2057400" indent="0" algn="ctr">
+              <a:buNone/>
+              <a:defRPr sz="1200"/>
             </a:lvl7pPr>
-            <a:lvl8pPr marL="3200400" indent="0" algn="ctr">
-              <a:buNone/>
-              <a:defRPr sz="1600"/>
+            <a:lvl8pPr marL="2400300" indent="0" algn="ctr">
+              <a:buNone/>
+              <a:defRPr sz="1200"/>
             </a:lvl8pPr>
-            <a:lvl9pPr marL="3657600" indent="0" algn="ctr">
-              <a:buNone/>
-              <a:defRPr sz="1600"/>
+            <a:lvl9pPr marL="2743200" indent="0" algn="ctr">
+              <a:buNone/>
+              <a:defRPr sz="1200"/>
             </a:lvl9pPr>
           </a:lstStyle>
           <a:p>
@@ -243,7 +244,7 @@
           <a:p>
             <a:fld id="{A8807BD6-6992-C249-965B-1D9A8EEDFA75}" type="datetimeFigureOut">
               <a:rPr lang="en-US" smtClean="0"/>
-              <a:t>2/27/21</a:t>
+              <a:t>2/28/21</a:t>
             </a:fld>
             <a:endParaRPr lang="en-US"/>
           </a:p>
@@ -294,7 +295,7 @@
     </p:spTree>
     <p:extLst>
       <p:ext uri="{BB962C8B-B14F-4D97-AF65-F5344CB8AC3E}">
-        <p14:creationId xmlns:p14="http://schemas.microsoft.com/office/powerpoint/2010/main" val="1999312774"/>
+        <p14:creationId xmlns:p14="http://schemas.microsoft.com/office/powerpoint/2010/main" val="1366004109"/>
       </p:ext>
     </p:extLst>
   </p:cSld>
@@ -413,7 +414,7 @@
           <a:p>
             <a:fld id="{A8807BD6-6992-C249-965B-1D9A8EEDFA75}" type="datetimeFigureOut">
               <a:rPr lang="en-US" smtClean="0"/>
-              <a:t>2/27/21</a:t>
+              <a:t>2/28/21</a:t>
             </a:fld>
             <a:endParaRPr lang="en-US"/>
           </a:p>
@@ -464,7 +465,7 @@
     </p:spTree>
     <p:extLst>
       <p:ext uri="{BB962C8B-B14F-4D97-AF65-F5344CB8AC3E}">
-        <p14:creationId xmlns:p14="http://schemas.microsoft.com/office/powerpoint/2010/main" val="2818771633"/>
+        <p14:creationId xmlns:p14="http://schemas.microsoft.com/office/powerpoint/2010/main" val="3373333494"/>
       </p:ext>
     </p:extLst>
   </p:cSld>
@@ -503,8 +504,8 @@
         </p:nvSpPr>
         <p:spPr>
           <a:xfrm>
-            <a:off x="6543675" y="365125"/>
-            <a:ext cx="1971675" cy="5811838"/>
+            <a:off x="6543675" y="304271"/>
+            <a:ext cx="1971675" cy="4843198"/>
           </a:xfrm>
         </p:spPr>
         <p:txBody>
@@ -531,8 +532,8 @@
         </p:nvSpPr>
         <p:spPr>
           <a:xfrm>
-            <a:off x="628650" y="365125"/>
-            <a:ext cx="5800725" cy="5811838"/>
+            <a:off x="628650" y="304271"/>
+            <a:ext cx="5800725" cy="4843198"/>
           </a:xfrm>
         </p:spPr>
         <p:txBody>
@@ -593,7 +594,7 @@
           <a:p>
             <a:fld id="{A8807BD6-6992-C249-965B-1D9A8EEDFA75}" type="datetimeFigureOut">
               <a:rPr lang="en-US" smtClean="0"/>
-              <a:t>2/27/21</a:t>
+              <a:t>2/28/21</a:t>
             </a:fld>
             <a:endParaRPr lang="en-US"/>
           </a:p>
@@ -644,7 +645,7 @@
     </p:spTree>
     <p:extLst>
       <p:ext uri="{BB962C8B-B14F-4D97-AF65-F5344CB8AC3E}">
-        <p14:creationId xmlns:p14="http://schemas.microsoft.com/office/powerpoint/2010/main" val="4252952727"/>
+        <p14:creationId xmlns:p14="http://schemas.microsoft.com/office/powerpoint/2010/main" val="2446179001"/>
       </p:ext>
     </p:extLst>
   </p:cSld>
@@ -763,7 +764,7 @@
           <a:p>
             <a:fld id="{A8807BD6-6992-C249-965B-1D9A8EEDFA75}" type="datetimeFigureOut">
               <a:rPr lang="en-US" smtClean="0"/>
-              <a:t>2/27/21</a:t>
+              <a:t>2/28/21</a:t>
             </a:fld>
             <a:endParaRPr lang="en-US"/>
           </a:p>
@@ -814,7 +815,7 @@
     </p:spTree>
     <p:extLst>
       <p:ext uri="{BB962C8B-B14F-4D97-AF65-F5344CB8AC3E}">
-        <p14:creationId xmlns:p14="http://schemas.microsoft.com/office/powerpoint/2010/main" val="3803105062"/>
+        <p14:creationId xmlns:p14="http://schemas.microsoft.com/office/powerpoint/2010/main" val="1483174783"/>
       </p:ext>
     </p:extLst>
   </p:cSld>
@@ -853,15 +854,15 @@
         </p:nvSpPr>
         <p:spPr>
           <a:xfrm>
-            <a:off x="623888" y="1709739"/>
-            <a:ext cx="7886700" cy="2852737"/>
+            <a:off x="623888" y="1424782"/>
+            <a:ext cx="7886700" cy="2377281"/>
           </a:xfrm>
         </p:spPr>
         <p:txBody>
           <a:bodyPr anchor="b"/>
           <a:lstStyle>
             <a:lvl1pPr>
-              <a:defRPr sz="6000"/>
+              <a:defRPr sz="4500"/>
             </a:lvl1pPr>
           </a:lstStyle>
           <a:p>
@@ -885,8 +886,8 @@
         </p:nvSpPr>
         <p:spPr>
           <a:xfrm>
-            <a:off x="623888" y="4589464"/>
-            <a:ext cx="7886700" cy="1500187"/>
+            <a:off x="623888" y="3824553"/>
+            <a:ext cx="7886700" cy="1250156"/>
           </a:xfrm>
         </p:spPr>
         <p:txBody>
@@ -894,15 +895,17 @@
           <a:lstStyle>
             <a:lvl1pPr marL="0" indent="0">
               <a:buNone/>
-              <a:defRPr sz="2400">
+              <a:defRPr sz="1800">
                 <a:solidFill>
-                  <a:schemeClr val="tx1"/>
+                  <a:schemeClr val="tx1">
+                    <a:tint val="75000"/>
+                  </a:schemeClr>
                 </a:solidFill>
               </a:defRPr>
             </a:lvl1pPr>
-            <a:lvl2pPr marL="457200" indent="0">
-              <a:buNone/>
-              <a:defRPr sz="2000">
+            <a:lvl2pPr marL="342900" indent="0">
+              <a:buNone/>
+              <a:defRPr sz="1500">
                 <a:solidFill>
                   <a:schemeClr val="tx1">
                     <a:tint val="75000"/>
@@ -910,9 +913,9 @@
                 </a:solidFill>
               </a:defRPr>
             </a:lvl2pPr>
-            <a:lvl3pPr marL="914400" indent="0">
-              <a:buNone/>
-              <a:defRPr sz="1800">
+            <a:lvl3pPr marL="685800" indent="0">
+              <a:buNone/>
+              <a:defRPr sz="1350">
                 <a:solidFill>
                   <a:schemeClr val="tx1">
                     <a:tint val="75000"/>
@@ -920,9 +923,9 @@
                 </a:solidFill>
               </a:defRPr>
             </a:lvl3pPr>
-            <a:lvl4pPr marL="1371600" indent="0">
-              <a:buNone/>
-              <a:defRPr sz="1600">
+            <a:lvl4pPr marL="1028700" indent="0">
+              <a:buNone/>
+              <a:defRPr sz="1200">
                 <a:solidFill>
                   <a:schemeClr val="tx1">
                     <a:tint val="75000"/>
@@ -930,9 +933,9 @@
                 </a:solidFill>
               </a:defRPr>
             </a:lvl4pPr>
-            <a:lvl5pPr marL="1828800" indent="0">
-              <a:buNone/>
-              <a:defRPr sz="1600">
+            <a:lvl5pPr marL="1371600" indent="0">
+              <a:buNone/>
+              <a:defRPr sz="1200">
                 <a:solidFill>
                   <a:schemeClr val="tx1">
                     <a:tint val="75000"/>
@@ -940,9 +943,9 @@
                 </a:solidFill>
               </a:defRPr>
             </a:lvl5pPr>
-            <a:lvl6pPr marL="2286000" indent="0">
-              <a:buNone/>
-              <a:defRPr sz="1600">
+            <a:lvl6pPr marL="1714500" indent="0">
+              <a:buNone/>
+              <a:defRPr sz="1200">
                 <a:solidFill>
                   <a:schemeClr val="tx1">
                     <a:tint val="75000"/>
@@ -950,9 +953,9 @@
                 </a:solidFill>
               </a:defRPr>
             </a:lvl6pPr>
-            <a:lvl7pPr marL="2743200" indent="0">
-              <a:buNone/>
-              <a:defRPr sz="1600">
+            <a:lvl7pPr marL="2057400" indent="0">
+              <a:buNone/>
+              <a:defRPr sz="1200">
                 <a:solidFill>
                   <a:schemeClr val="tx1">
                     <a:tint val="75000"/>
@@ -960,9 +963,9 @@
                 </a:solidFill>
               </a:defRPr>
             </a:lvl7pPr>
-            <a:lvl8pPr marL="3200400" indent="0">
-              <a:buNone/>
-              <a:defRPr sz="1600">
+            <a:lvl8pPr marL="2400300" indent="0">
+              <a:buNone/>
+              <a:defRPr sz="1200">
                 <a:solidFill>
                   <a:schemeClr val="tx1">
                     <a:tint val="75000"/>
@@ -970,9 +973,9 @@
                 </a:solidFill>
               </a:defRPr>
             </a:lvl8pPr>
-            <a:lvl9pPr marL="3657600" indent="0">
-              <a:buNone/>
-              <a:defRPr sz="1600">
+            <a:lvl9pPr marL="2743200" indent="0">
+              <a:buNone/>
+              <a:defRPr sz="1200">
                 <a:solidFill>
                   <a:schemeClr val="tx1">
                     <a:tint val="75000"/>
@@ -1007,7 +1010,7 @@
           <a:p>
             <a:fld id="{A8807BD6-6992-C249-965B-1D9A8EEDFA75}" type="datetimeFigureOut">
               <a:rPr lang="en-US" smtClean="0"/>
-              <a:t>2/27/21</a:t>
+              <a:t>2/28/21</a:t>
             </a:fld>
             <a:endParaRPr lang="en-US"/>
           </a:p>
@@ -1058,7 +1061,7 @@
     </p:spTree>
     <p:extLst>
       <p:ext uri="{BB962C8B-B14F-4D97-AF65-F5344CB8AC3E}">
-        <p14:creationId xmlns:p14="http://schemas.microsoft.com/office/powerpoint/2010/main" val="1324502309"/>
+        <p14:creationId xmlns:p14="http://schemas.microsoft.com/office/powerpoint/2010/main" val="590759180"/>
       </p:ext>
     </p:extLst>
   </p:cSld>
@@ -1120,8 +1123,8 @@
         </p:nvSpPr>
         <p:spPr>
           <a:xfrm>
-            <a:off x="628650" y="1825625"/>
-            <a:ext cx="3886200" cy="4351338"/>
+            <a:off x="628650" y="1521354"/>
+            <a:ext cx="3886200" cy="3626115"/>
           </a:xfrm>
         </p:spPr>
         <p:txBody>
@@ -1177,8 +1180,8 @@
         </p:nvSpPr>
         <p:spPr>
           <a:xfrm>
-            <a:off x="4629150" y="1825625"/>
-            <a:ext cx="3886200" cy="4351338"/>
+            <a:off x="4629150" y="1521354"/>
+            <a:ext cx="3886200" cy="3626115"/>
           </a:xfrm>
         </p:spPr>
         <p:txBody>
@@ -1239,7 +1242,7 @@
           <a:p>
             <a:fld id="{A8807BD6-6992-C249-965B-1D9A8EEDFA75}" type="datetimeFigureOut">
               <a:rPr lang="en-US" smtClean="0"/>
-              <a:t>2/27/21</a:t>
+              <a:t>2/28/21</a:t>
             </a:fld>
             <a:endParaRPr lang="en-US"/>
           </a:p>
@@ -1290,7 +1293,7 @@
     </p:spTree>
     <p:extLst>
       <p:ext uri="{BB962C8B-B14F-4D97-AF65-F5344CB8AC3E}">
-        <p14:creationId xmlns:p14="http://schemas.microsoft.com/office/powerpoint/2010/main" val="1449927341"/>
+        <p14:creationId xmlns:p14="http://schemas.microsoft.com/office/powerpoint/2010/main" val="359342478"/>
       </p:ext>
     </p:extLst>
   </p:cSld>
@@ -1329,8 +1332,8 @@
         </p:nvSpPr>
         <p:spPr>
           <a:xfrm>
-            <a:off x="629841" y="365126"/>
-            <a:ext cx="7886700" cy="1325563"/>
+            <a:off x="629841" y="304271"/>
+            <a:ext cx="7886700" cy="1104636"/>
           </a:xfrm>
         </p:spPr>
         <p:txBody>
@@ -1357,8 +1360,8 @@
         </p:nvSpPr>
         <p:spPr>
           <a:xfrm>
-            <a:off x="629842" y="1681163"/>
-            <a:ext cx="3868340" cy="823912"/>
+            <a:off x="629842" y="1400969"/>
+            <a:ext cx="3868340" cy="686593"/>
           </a:xfrm>
         </p:spPr>
         <p:txBody>
@@ -1366,39 +1369,39 @@
           <a:lstStyle>
             <a:lvl1pPr marL="0" indent="0">
               <a:buNone/>
-              <a:defRPr sz="2400" b="1"/>
+              <a:defRPr sz="1800" b="1"/>
             </a:lvl1pPr>
-            <a:lvl2pPr marL="457200" indent="0">
-              <a:buNone/>
-              <a:defRPr sz="2000" b="1"/>
+            <a:lvl2pPr marL="342900" indent="0">
+              <a:buNone/>
+              <a:defRPr sz="1500" b="1"/>
             </a:lvl2pPr>
-            <a:lvl3pPr marL="914400" indent="0">
-              <a:buNone/>
-              <a:defRPr sz="1800" b="1"/>
+            <a:lvl3pPr marL="685800" indent="0">
+              <a:buNone/>
+              <a:defRPr sz="1350" b="1"/>
             </a:lvl3pPr>
-            <a:lvl4pPr marL="1371600" indent="0">
-              <a:buNone/>
-              <a:defRPr sz="1600" b="1"/>
+            <a:lvl4pPr marL="1028700" indent="0">
+              <a:buNone/>
+              <a:defRPr sz="1200" b="1"/>
             </a:lvl4pPr>
-            <a:lvl5pPr marL="1828800" indent="0">
-              <a:buNone/>
-              <a:defRPr sz="1600" b="1"/>
+            <a:lvl5pPr marL="1371600" indent="0">
+              <a:buNone/>
+              <a:defRPr sz="1200" b="1"/>
             </a:lvl5pPr>
-            <a:lvl6pPr marL="2286000" indent="0">
-              <a:buNone/>
-              <a:defRPr sz="1600" b="1"/>
+            <a:lvl6pPr marL="1714500" indent="0">
+              <a:buNone/>
+              <a:defRPr sz="1200" b="1"/>
             </a:lvl6pPr>
-            <a:lvl7pPr marL="2743200" indent="0">
-              <a:buNone/>
-              <a:defRPr sz="1600" b="1"/>
+            <a:lvl7pPr marL="2057400" indent="0">
+              <a:buNone/>
+              <a:defRPr sz="1200" b="1"/>
             </a:lvl7pPr>
-            <a:lvl8pPr marL="3200400" indent="0">
-              <a:buNone/>
-              <a:defRPr sz="1600" b="1"/>
+            <a:lvl8pPr marL="2400300" indent="0">
+              <a:buNone/>
+              <a:defRPr sz="1200" b="1"/>
             </a:lvl8pPr>
-            <a:lvl9pPr marL="3657600" indent="0">
-              <a:buNone/>
-              <a:defRPr sz="1600" b="1"/>
+            <a:lvl9pPr marL="2743200" indent="0">
+              <a:buNone/>
+              <a:defRPr sz="1200" b="1"/>
             </a:lvl9pPr>
           </a:lstStyle>
           <a:p>
@@ -1422,8 +1425,8 @@
         </p:nvSpPr>
         <p:spPr>
           <a:xfrm>
-            <a:off x="629842" y="2505075"/>
-            <a:ext cx="3868340" cy="3684588"/>
+            <a:off x="629842" y="2087563"/>
+            <a:ext cx="3868340" cy="3070490"/>
           </a:xfrm>
         </p:spPr>
         <p:txBody>
@@ -1479,8 +1482,8 @@
         </p:nvSpPr>
         <p:spPr>
           <a:xfrm>
-            <a:off x="4629150" y="1681163"/>
-            <a:ext cx="3887391" cy="823912"/>
+            <a:off x="4629150" y="1400969"/>
+            <a:ext cx="3887391" cy="686593"/>
           </a:xfrm>
         </p:spPr>
         <p:txBody>
@@ -1488,39 +1491,39 @@
           <a:lstStyle>
             <a:lvl1pPr marL="0" indent="0">
               <a:buNone/>
-              <a:defRPr sz="2400" b="1"/>
+              <a:defRPr sz="1800" b="1"/>
             </a:lvl1pPr>
-            <a:lvl2pPr marL="457200" indent="0">
-              <a:buNone/>
-              <a:defRPr sz="2000" b="1"/>
+            <a:lvl2pPr marL="342900" indent="0">
+              <a:buNone/>
+              <a:defRPr sz="1500" b="1"/>
             </a:lvl2pPr>
-            <a:lvl3pPr marL="914400" indent="0">
-              <a:buNone/>
-              <a:defRPr sz="1800" b="1"/>
+            <a:lvl3pPr marL="685800" indent="0">
+              <a:buNone/>
+              <a:defRPr sz="1350" b="1"/>
             </a:lvl3pPr>
-            <a:lvl4pPr marL="1371600" indent="0">
-              <a:buNone/>
-              <a:defRPr sz="1600" b="1"/>
+            <a:lvl4pPr marL="1028700" indent="0">
+              <a:buNone/>
+              <a:defRPr sz="1200" b="1"/>
             </a:lvl4pPr>
-            <a:lvl5pPr marL="1828800" indent="0">
-              <a:buNone/>
-              <a:defRPr sz="1600" b="1"/>
+            <a:lvl5pPr marL="1371600" indent="0">
+              <a:buNone/>
+              <a:defRPr sz="1200" b="1"/>
             </a:lvl5pPr>
-            <a:lvl6pPr marL="2286000" indent="0">
-              <a:buNone/>
-              <a:defRPr sz="1600" b="1"/>
+            <a:lvl6pPr marL="1714500" indent="0">
+              <a:buNone/>
+              <a:defRPr sz="1200" b="1"/>
             </a:lvl6pPr>
-            <a:lvl7pPr marL="2743200" indent="0">
-              <a:buNone/>
-              <a:defRPr sz="1600" b="1"/>
+            <a:lvl7pPr marL="2057400" indent="0">
+              <a:buNone/>
+              <a:defRPr sz="1200" b="1"/>
             </a:lvl7pPr>
-            <a:lvl8pPr marL="3200400" indent="0">
-              <a:buNone/>
-              <a:defRPr sz="1600" b="1"/>
+            <a:lvl8pPr marL="2400300" indent="0">
+              <a:buNone/>
+              <a:defRPr sz="1200" b="1"/>
             </a:lvl8pPr>
-            <a:lvl9pPr marL="3657600" indent="0">
-              <a:buNone/>
-              <a:defRPr sz="1600" b="1"/>
+            <a:lvl9pPr marL="2743200" indent="0">
+              <a:buNone/>
+              <a:defRPr sz="1200" b="1"/>
             </a:lvl9pPr>
           </a:lstStyle>
           <a:p>
@@ -1544,8 +1547,8 @@
         </p:nvSpPr>
         <p:spPr>
           <a:xfrm>
-            <a:off x="4629150" y="2505075"/>
-            <a:ext cx="3887391" cy="3684588"/>
+            <a:off x="4629150" y="2087563"/>
+            <a:ext cx="3887391" cy="3070490"/>
           </a:xfrm>
         </p:spPr>
         <p:txBody>
@@ -1606,7 +1609,7 @@
           <a:p>
             <a:fld id="{A8807BD6-6992-C249-965B-1D9A8EEDFA75}" type="datetimeFigureOut">
               <a:rPr lang="en-US" smtClean="0"/>
-              <a:t>2/27/21</a:t>
+              <a:t>2/28/21</a:t>
             </a:fld>
             <a:endParaRPr lang="en-US"/>
           </a:p>
@@ -1657,7 +1660,7 @@
     </p:spTree>
     <p:extLst>
       <p:ext uri="{BB962C8B-B14F-4D97-AF65-F5344CB8AC3E}">
-        <p14:creationId xmlns:p14="http://schemas.microsoft.com/office/powerpoint/2010/main" val="2960094665"/>
+        <p14:creationId xmlns:p14="http://schemas.microsoft.com/office/powerpoint/2010/main" val="3178118941"/>
       </p:ext>
     </p:extLst>
   </p:cSld>
@@ -1724,7 +1727,7 @@
           <a:p>
             <a:fld id="{A8807BD6-6992-C249-965B-1D9A8EEDFA75}" type="datetimeFigureOut">
               <a:rPr lang="en-US" smtClean="0"/>
-              <a:t>2/27/21</a:t>
+              <a:t>2/28/21</a:t>
             </a:fld>
             <a:endParaRPr lang="en-US"/>
           </a:p>
@@ -1775,7 +1778,7 @@
     </p:spTree>
     <p:extLst>
       <p:ext uri="{BB962C8B-B14F-4D97-AF65-F5344CB8AC3E}">
-        <p14:creationId xmlns:p14="http://schemas.microsoft.com/office/powerpoint/2010/main" val="4206529359"/>
+        <p14:creationId xmlns:p14="http://schemas.microsoft.com/office/powerpoint/2010/main" val="29170080"/>
       </p:ext>
     </p:extLst>
   </p:cSld>
@@ -1819,7 +1822,7 @@
           <a:p>
             <a:fld id="{A8807BD6-6992-C249-965B-1D9A8EEDFA75}" type="datetimeFigureOut">
               <a:rPr lang="en-US" smtClean="0"/>
-              <a:t>2/27/21</a:t>
+              <a:t>2/28/21</a:t>
             </a:fld>
             <a:endParaRPr lang="en-US"/>
           </a:p>
@@ -1870,7 +1873,7 @@
     </p:spTree>
     <p:extLst>
       <p:ext uri="{BB962C8B-B14F-4D97-AF65-F5344CB8AC3E}">
-        <p14:creationId xmlns:p14="http://schemas.microsoft.com/office/powerpoint/2010/main" val="2984629976"/>
+        <p14:creationId xmlns:p14="http://schemas.microsoft.com/office/powerpoint/2010/main" val="2031735562"/>
       </p:ext>
     </p:extLst>
   </p:cSld>
@@ -1909,15 +1912,15 @@
         </p:nvSpPr>
         <p:spPr>
           <a:xfrm>
-            <a:off x="629841" y="457200"/>
-            <a:ext cx="2949178" cy="1600200"/>
+            <a:off x="629841" y="381000"/>
+            <a:ext cx="2949178" cy="1333500"/>
           </a:xfrm>
         </p:spPr>
         <p:txBody>
           <a:bodyPr anchor="b"/>
           <a:lstStyle>
             <a:lvl1pPr>
-              <a:defRPr sz="3200"/>
+              <a:defRPr sz="2400"/>
             </a:lvl1pPr>
           </a:lstStyle>
           <a:p>
@@ -1941,39 +1944,39 @@
         </p:nvSpPr>
         <p:spPr>
           <a:xfrm>
-            <a:off x="3887391" y="987426"/>
-            <a:ext cx="4629150" cy="4873625"/>
+            <a:off x="3887391" y="822855"/>
+            <a:ext cx="4629150" cy="4061354"/>
           </a:xfrm>
         </p:spPr>
         <p:txBody>
           <a:bodyPr/>
           <a:lstStyle>
             <a:lvl1pPr>
-              <a:defRPr sz="3200"/>
+              <a:defRPr sz="2400"/>
             </a:lvl1pPr>
             <a:lvl2pPr>
-              <a:defRPr sz="2800"/>
+              <a:defRPr sz="2100"/>
             </a:lvl2pPr>
             <a:lvl3pPr>
-              <a:defRPr sz="2400"/>
+              <a:defRPr sz="1800"/>
             </a:lvl3pPr>
             <a:lvl4pPr>
-              <a:defRPr sz="2000"/>
+              <a:defRPr sz="1500"/>
             </a:lvl4pPr>
             <a:lvl5pPr>
-              <a:defRPr sz="2000"/>
+              <a:defRPr sz="1500"/>
             </a:lvl5pPr>
             <a:lvl6pPr>
-              <a:defRPr sz="2000"/>
+              <a:defRPr sz="1500"/>
             </a:lvl6pPr>
             <a:lvl7pPr>
-              <a:defRPr sz="2000"/>
+              <a:defRPr sz="1500"/>
             </a:lvl7pPr>
             <a:lvl8pPr>
-              <a:defRPr sz="2000"/>
+              <a:defRPr sz="1500"/>
             </a:lvl8pPr>
             <a:lvl9pPr>
-              <a:defRPr sz="2000"/>
+              <a:defRPr sz="1500"/>
             </a:lvl9pPr>
           </a:lstStyle>
           <a:p>
@@ -2026,8 +2029,8 @@
         </p:nvSpPr>
         <p:spPr>
           <a:xfrm>
-            <a:off x="629841" y="2057400"/>
-            <a:ext cx="2949178" cy="3811588"/>
+            <a:off x="629841" y="1714500"/>
+            <a:ext cx="2949178" cy="3176323"/>
           </a:xfrm>
         </p:spPr>
         <p:txBody>
@@ -2035,39 +2038,39 @@
           <a:lstStyle>
             <a:lvl1pPr marL="0" indent="0">
               <a:buNone/>
-              <a:defRPr sz="1600"/>
+              <a:defRPr sz="1200"/>
             </a:lvl1pPr>
-            <a:lvl2pPr marL="457200" indent="0">
-              <a:buNone/>
-              <a:defRPr sz="1400"/>
+            <a:lvl2pPr marL="342900" indent="0">
+              <a:buNone/>
+              <a:defRPr sz="1050"/>
             </a:lvl2pPr>
-            <a:lvl3pPr marL="914400" indent="0">
-              <a:buNone/>
-              <a:defRPr sz="1200"/>
+            <a:lvl3pPr marL="685800" indent="0">
+              <a:buNone/>
+              <a:defRPr sz="900"/>
             </a:lvl3pPr>
-            <a:lvl4pPr marL="1371600" indent="0">
-              <a:buNone/>
-              <a:defRPr sz="1000"/>
+            <a:lvl4pPr marL="1028700" indent="0">
+              <a:buNone/>
+              <a:defRPr sz="750"/>
             </a:lvl4pPr>
-            <a:lvl5pPr marL="1828800" indent="0">
-              <a:buNone/>
-              <a:defRPr sz="1000"/>
+            <a:lvl5pPr marL="1371600" indent="0">
+              <a:buNone/>
+              <a:defRPr sz="750"/>
             </a:lvl5pPr>
-            <a:lvl6pPr marL="2286000" indent="0">
-              <a:buNone/>
-              <a:defRPr sz="1000"/>
+            <a:lvl6pPr marL="1714500" indent="0">
+              <a:buNone/>
+              <a:defRPr sz="750"/>
             </a:lvl6pPr>
-            <a:lvl7pPr marL="2743200" indent="0">
-              <a:buNone/>
-              <a:defRPr sz="1000"/>
+            <a:lvl7pPr marL="2057400" indent="0">
+              <a:buNone/>
+              <a:defRPr sz="750"/>
             </a:lvl7pPr>
-            <a:lvl8pPr marL="3200400" indent="0">
-              <a:buNone/>
-              <a:defRPr sz="1000"/>
+            <a:lvl8pPr marL="2400300" indent="0">
+              <a:buNone/>
+              <a:defRPr sz="750"/>
             </a:lvl8pPr>
-            <a:lvl9pPr marL="3657600" indent="0">
-              <a:buNone/>
-              <a:defRPr sz="1000"/>
+            <a:lvl9pPr marL="2743200" indent="0">
+              <a:buNone/>
+              <a:defRPr sz="750"/>
             </a:lvl9pPr>
           </a:lstStyle>
           <a:p>
@@ -2096,7 +2099,7 @@
           <a:p>
             <a:fld id="{A8807BD6-6992-C249-965B-1D9A8EEDFA75}" type="datetimeFigureOut">
               <a:rPr lang="en-US" smtClean="0"/>
-              <a:t>2/27/21</a:t>
+              <a:t>2/28/21</a:t>
             </a:fld>
             <a:endParaRPr lang="en-US"/>
           </a:p>
@@ -2147,7 +2150,7 @@
     </p:spTree>
     <p:extLst>
       <p:ext uri="{BB962C8B-B14F-4D97-AF65-F5344CB8AC3E}">
-        <p14:creationId xmlns:p14="http://schemas.microsoft.com/office/powerpoint/2010/main" val="319117264"/>
+        <p14:creationId xmlns:p14="http://schemas.microsoft.com/office/powerpoint/2010/main" val="3728091122"/>
       </p:ext>
     </p:extLst>
   </p:cSld>
@@ -2186,15 +2189,15 @@
         </p:nvSpPr>
         <p:spPr>
           <a:xfrm>
-            <a:off x="629841" y="457200"/>
-            <a:ext cx="2949178" cy="1600200"/>
+            <a:off x="629841" y="381000"/>
+            <a:ext cx="2949178" cy="1333500"/>
           </a:xfrm>
         </p:spPr>
         <p:txBody>
           <a:bodyPr anchor="b"/>
           <a:lstStyle>
             <a:lvl1pPr>
-              <a:defRPr sz="3200"/>
+              <a:defRPr sz="2400"/>
             </a:lvl1pPr>
           </a:lstStyle>
           <a:p>
@@ -2218,8 +2221,8 @@
         </p:nvSpPr>
         <p:spPr>
           <a:xfrm>
-            <a:off x="3887391" y="987426"/>
-            <a:ext cx="4629150" cy="4873625"/>
+            <a:off x="3887391" y="822855"/>
+            <a:ext cx="4629150" cy="4061354"/>
           </a:xfrm>
         </p:spPr>
         <p:txBody>
@@ -2227,39 +2230,39 @@
           <a:lstStyle>
             <a:lvl1pPr marL="0" indent="0">
               <a:buNone/>
-              <a:defRPr sz="3200"/>
+              <a:defRPr sz="2400"/>
             </a:lvl1pPr>
-            <a:lvl2pPr marL="457200" indent="0">
-              <a:buNone/>
-              <a:defRPr sz="2800"/>
+            <a:lvl2pPr marL="342900" indent="0">
+              <a:buNone/>
+              <a:defRPr sz="2100"/>
             </a:lvl2pPr>
-            <a:lvl3pPr marL="914400" indent="0">
-              <a:buNone/>
-              <a:defRPr sz="2400"/>
+            <a:lvl3pPr marL="685800" indent="0">
+              <a:buNone/>
+              <a:defRPr sz="1800"/>
             </a:lvl3pPr>
-            <a:lvl4pPr marL="1371600" indent="0">
-              <a:buNone/>
-              <a:defRPr sz="2000"/>
+            <a:lvl4pPr marL="1028700" indent="0">
+              <a:buNone/>
+              <a:defRPr sz="1500"/>
             </a:lvl4pPr>
-            <a:lvl5pPr marL="1828800" indent="0">
-              <a:buNone/>
-              <a:defRPr sz="2000"/>
+            <a:lvl5pPr marL="1371600" indent="0">
+              <a:buNone/>
+              <a:defRPr sz="1500"/>
             </a:lvl5pPr>
-            <a:lvl6pPr marL="2286000" indent="0">
-              <a:buNone/>
-              <a:defRPr sz="2000"/>
+            <a:lvl6pPr marL="1714500" indent="0">
+              <a:buNone/>
+              <a:defRPr sz="1500"/>
             </a:lvl6pPr>
-            <a:lvl7pPr marL="2743200" indent="0">
-              <a:buNone/>
-              <a:defRPr sz="2000"/>
+            <a:lvl7pPr marL="2057400" indent="0">
+              <a:buNone/>
+              <a:defRPr sz="1500"/>
             </a:lvl7pPr>
-            <a:lvl8pPr marL="3200400" indent="0">
-              <a:buNone/>
-              <a:defRPr sz="2000"/>
+            <a:lvl8pPr marL="2400300" indent="0">
+              <a:buNone/>
+              <a:defRPr sz="1500"/>
             </a:lvl8pPr>
-            <a:lvl9pPr marL="3657600" indent="0">
-              <a:buNone/>
-              <a:defRPr sz="2000"/>
+            <a:lvl9pPr marL="2743200" indent="0">
+              <a:buNone/>
+              <a:defRPr sz="1500"/>
             </a:lvl9pPr>
           </a:lstStyle>
           <a:p>
@@ -2283,8 +2286,8 @@
         </p:nvSpPr>
         <p:spPr>
           <a:xfrm>
-            <a:off x="629841" y="2057400"/>
-            <a:ext cx="2949178" cy="3811588"/>
+            <a:off x="629841" y="1714500"/>
+            <a:ext cx="2949178" cy="3176323"/>
           </a:xfrm>
         </p:spPr>
         <p:txBody>
@@ -2292,39 +2295,39 @@
           <a:lstStyle>
             <a:lvl1pPr marL="0" indent="0">
               <a:buNone/>
-              <a:defRPr sz="1600"/>
+              <a:defRPr sz="1200"/>
             </a:lvl1pPr>
-            <a:lvl2pPr marL="457200" indent="0">
-              <a:buNone/>
-              <a:defRPr sz="1400"/>
+            <a:lvl2pPr marL="342900" indent="0">
+              <a:buNone/>
+              <a:defRPr sz="1050"/>
             </a:lvl2pPr>
-            <a:lvl3pPr marL="914400" indent="0">
-              <a:buNone/>
-              <a:defRPr sz="1200"/>
+            <a:lvl3pPr marL="685800" indent="0">
+              <a:buNone/>
+              <a:defRPr sz="900"/>
             </a:lvl3pPr>
-            <a:lvl4pPr marL="1371600" indent="0">
-              <a:buNone/>
-              <a:defRPr sz="1000"/>
+            <a:lvl4pPr marL="1028700" indent="0">
+              <a:buNone/>
+              <a:defRPr sz="750"/>
             </a:lvl4pPr>
-            <a:lvl5pPr marL="1828800" indent="0">
-              <a:buNone/>
-              <a:defRPr sz="1000"/>
+            <a:lvl5pPr marL="1371600" indent="0">
+              <a:buNone/>
+              <a:defRPr sz="750"/>
             </a:lvl5pPr>
-            <a:lvl6pPr marL="2286000" indent="0">
-              <a:buNone/>
-              <a:defRPr sz="1000"/>
+            <a:lvl6pPr marL="1714500" indent="0">
+              <a:buNone/>
+              <a:defRPr sz="750"/>
             </a:lvl6pPr>
-            <a:lvl7pPr marL="2743200" indent="0">
-              <a:buNone/>
-              <a:defRPr sz="1000"/>
+            <a:lvl7pPr marL="2057400" indent="0">
+              <a:buNone/>
+              <a:defRPr sz="750"/>
             </a:lvl7pPr>
-            <a:lvl8pPr marL="3200400" indent="0">
-              <a:buNone/>
-              <a:defRPr sz="1000"/>
+            <a:lvl8pPr marL="2400300" indent="0">
+              <a:buNone/>
+              <a:defRPr sz="750"/>
             </a:lvl8pPr>
-            <a:lvl9pPr marL="3657600" indent="0">
-              <a:buNone/>
-              <a:defRPr sz="1000"/>
+            <a:lvl9pPr marL="2743200" indent="0">
+              <a:buNone/>
+              <a:defRPr sz="750"/>
             </a:lvl9pPr>
           </a:lstStyle>
           <a:p>
@@ -2353,7 +2356,7 @@
           <a:p>
             <a:fld id="{A8807BD6-6992-C249-965B-1D9A8EEDFA75}" type="datetimeFigureOut">
               <a:rPr lang="en-US" smtClean="0"/>
-              <a:t>2/27/21</a:t>
+              <a:t>2/28/21</a:t>
             </a:fld>
             <a:endParaRPr lang="en-US"/>
           </a:p>
@@ -2404,7 +2407,7 @@
     </p:spTree>
     <p:extLst>
       <p:ext uri="{BB962C8B-B14F-4D97-AF65-F5344CB8AC3E}">
-        <p14:creationId xmlns:p14="http://schemas.microsoft.com/office/powerpoint/2010/main" val="180580097"/>
+        <p14:creationId xmlns:p14="http://schemas.microsoft.com/office/powerpoint/2010/main" val="1811799381"/>
       </p:ext>
     </p:extLst>
   </p:cSld>
@@ -2448,8 +2451,8 @@
         </p:nvSpPr>
         <p:spPr>
           <a:xfrm>
-            <a:off x="628650" y="365126"/>
-            <a:ext cx="7886700" cy="1325563"/>
+            <a:off x="628650" y="304271"/>
+            <a:ext cx="7886700" cy="1104636"/>
           </a:xfrm>
           <a:prstGeom prst="rect">
             <a:avLst/>
@@ -2481,8 +2484,8 @@
         </p:nvSpPr>
         <p:spPr>
           <a:xfrm>
-            <a:off x="628650" y="1825625"/>
-            <a:ext cx="7886700" cy="4351338"/>
+            <a:off x="628650" y="1521354"/>
+            <a:ext cx="7886700" cy="3626115"/>
           </a:xfrm>
           <a:prstGeom prst="rect">
             <a:avLst/>
@@ -2543,8 +2546,8 @@
         </p:nvSpPr>
         <p:spPr>
           <a:xfrm>
-            <a:off x="628650" y="6356351"/>
-            <a:ext cx="2057400" cy="365125"/>
+            <a:off x="628650" y="5296959"/>
+            <a:ext cx="2057400" cy="304271"/>
           </a:xfrm>
           <a:prstGeom prst="rect">
             <a:avLst/>
@@ -2554,7 +2557,7 @@
           <a:bodyPr vert="horz" lIns="91440" tIns="45720" rIns="91440" bIns="45720" rtlCol="0" anchor="ctr"/>
           <a:lstStyle>
             <a:lvl1pPr algn="l">
-              <a:defRPr sz="1200">
+              <a:defRPr sz="900">
                 <a:solidFill>
                   <a:schemeClr val="tx1">
                     <a:tint val="75000"/>
@@ -2566,7 +2569,7 @@
           <a:p>
             <a:fld id="{A8807BD6-6992-C249-965B-1D9A8EEDFA75}" type="datetimeFigureOut">
               <a:rPr lang="en-US" smtClean="0"/>
-              <a:t>2/27/21</a:t>
+              <a:t>2/28/21</a:t>
             </a:fld>
             <a:endParaRPr lang="en-US"/>
           </a:p>
@@ -2584,8 +2587,8 @@
         </p:nvSpPr>
         <p:spPr>
           <a:xfrm>
-            <a:off x="3028950" y="6356351"/>
-            <a:ext cx="3086100" cy="365125"/>
+            <a:off x="3028950" y="5296959"/>
+            <a:ext cx="3086100" cy="304271"/>
           </a:xfrm>
           <a:prstGeom prst="rect">
             <a:avLst/>
@@ -2595,7 +2598,7 @@
           <a:bodyPr vert="horz" lIns="91440" tIns="45720" rIns="91440" bIns="45720" rtlCol="0" anchor="ctr"/>
           <a:lstStyle>
             <a:lvl1pPr algn="ctr">
-              <a:defRPr sz="1200">
+              <a:defRPr sz="900">
                 <a:solidFill>
                   <a:schemeClr val="tx1">
                     <a:tint val="75000"/>
@@ -2621,8 +2624,8 @@
         </p:nvSpPr>
         <p:spPr>
           <a:xfrm>
-            <a:off x="6457950" y="6356351"/>
-            <a:ext cx="2057400" cy="365125"/>
+            <a:off x="6457950" y="5296959"/>
+            <a:ext cx="2057400" cy="304271"/>
           </a:xfrm>
           <a:prstGeom prst="rect">
             <a:avLst/>
@@ -2632,7 +2635,7 @@
           <a:bodyPr vert="horz" lIns="91440" tIns="45720" rIns="91440" bIns="45720" rtlCol="0" anchor="ctr"/>
           <a:lstStyle>
             <a:lvl1pPr algn="r">
-              <a:defRPr sz="1200">
+              <a:defRPr sz="900">
                 <a:solidFill>
                   <a:schemeClr val="tx1">
                     <a:tint val="75000"/>
@@ -2653,27 +2656,27 @@
     </p:spTree>
     <p:extLst>
       <p:ext uri="{BB962C8B-B14F-4D97-AF65-F5344CB8AC3E}">
-        <p14:creationId xmlns:p14="http://schemas.microsoft.com/office/powerpoint/2010/main" val="27197542"/>
+        <p14:creationId xmlns:p14="http://schemas.microsoft.com/office/powerpoint/2010/main" val="2393216909"/>
       </p:ext>
     </p:extLst>
   </p:cSld>
   <p:clrMap bg1="lt1" tx1="dk1" bg2="lt2" tx2="dk2" accent1="accent1" accent2="accent2" accent3="accent3" accent4="accent4" accent5="accent5" accent6="accent6" hlink="hlink" folHlink="folHlink"/>
   <p:sldLayoutIdLst>
-    <p:sldLayoutId id="2147483661" r:id="rId1"/>
-    <p:sldLayoutId id="2147483662" r:id="rId2"/>
-    <p:sldLayoutId id="2147483663" r:id="rId3"/>
-    <p:sldLayoutId id="2147483664" r:id="rId4"/>
-    <p:sldLayoutId id="2147483665" r:id="rId5"/>
-    <p:sldLayoutId id="2147483666" r:id="rId6"/>
-    <p:sldLayoutId id="2147483667" r:id="rId7"/>
-    <p:sldLayoutId id="2147483668" r:id="rId8"/>
-    <p:sldLayoutId id="2147483669" r:id="rId9"/>
-    <p:sldLayoutId id="2147483670" r:id="rId10"/>
-    <p:sldLayoutId id="2147483671" r:id="rId11"/>
+    <p:sldLayoutId id="2147483673" r:id="rId1"/>
+    <p:sldLayoutId id="2147483674" r:id="rId2"/>
+    <p:sldLayoutId id="2147483675" r:id="rId3"/>
+    <p:sldLayoutId id="2147483676" r:id="rId4"/>
+    <p:sldLayoutId id="2147483677" r:id="rId5"/>
+    <p:sldLayoutId id="2147483678" r:id="rId6"/>
+    <p:sldLayoutId id="2147483679" r:id="rId7"/>
+    <p:sldLayoutId id="2147483680" r:id="rId8"/>
+    <p:sldLayoutId id="2147483681" r:id="rId9"/>
+    <p:sldLayoutId id="2147483682" r:id="rId10"/>
+    <p:sldLayoutId id="2147483683" r:id="rId11"/>
   </p:sldLayoutIdLst>
   <p:txStyles>
     <p:titleStyle>
-      <a:lvl1pPr algn="l" defTabSz="914400" rtl="0" eaLnBrk="1" latinLnBrk="0" hangingPunct="1">
+      <a:lvl1pPr algn="l" defTabSz="685800" rtl="0" eaLnBrk="1" latinLnBrk="0" hangingPunct="1">
         <a:lnSpc>
           <a:spcPct val="90000"/>
         </a:lnSpc>
@@ -2681,7 +2684,7 @@
           <a:spcPct val="0"/>
         </a:spcBef>
         <a:buNone/>
-        <a:defRPr sz="4400" kern="1200">
+        <a:defRPr sz="3300" kern="1200">
           <a:solidFill>
             <a:schemeClr val="tx1"/>
           </a:solidFill>
@@ -2692,16 +2695,16 @@
       </a:lvl1pPr>
     </p:titleStyle>
     <p:bodyStyle>
-      <a:lvl1pPr marL="228600" indent="-228600" algn="l" defTabSz="914400" rtl="0" eaLnBrk="1" latinLnBrk="0" hangingPunct="1">
+      <a:lvl1pPr marL="171450" indent="-171450" algn="l" defTabSz="685800" rtl="0" eaLnBrk="1" latinLnBrk="0" hangingPunct="1">
         <a:lnSpc>
           <a:spcPct val="90000"/>
         </a:lnSpc>
         <a:spcBef>
-          <a:spcPts val="1000"/>
+          <a:spcPts val="750"/>
         </a:spcBef>
         <a:buFont typeface="Arial" panose="020B0604020202020204" pitchFamily="34" charset="0"/>
         <a:buChar char="•"/>
-        <a:defRPr sz="2800" kern="1200">
+        <a:defRPr sz="2100" kern="1200">
           <a:solidFill>
             <a:schemeClr val="tx1"/>
           </a:solidFill>
@@ -2710,48 +2713,12 @@
           <a:cs typeface="+mn-cs"/>
         </a:defRPr>
       </a:lvl1pPr>
-      <a:lvl2pPr marL="685800" indent="-228600" algn="l" defTabSz="914400" rtl="0" eaLnBrk="1" latinLnBrk="0" hangingPunct="1">
+      <a:lvl2pPr marL="514350" indent="-171450" algn="l" defTabSz="685800" rtl="0" eaLnBrk="1" latinLnBrk="0" hangingPunct="1">
         <a:lnSpc>
           <a:spcPct val="90000"/>
         </a:lnSpc>
         <a:spcBef>
-          <a:spcPts val="500"/>
-        </a:spcBef>
-        <a:buFont typeface="Arial" panose="020B0604020202020204" pitchFamily="34" charset="0"/>
-        <a:buChar char="•"/>
-        <a:defRPr sz="2400" kern="1200">
-          <a:solidFill>
-            <a:schemeClr val="tx1"/>
-          </a:solidFill>
-          <a:latin typeface="+mn-lt"/>
-          <a:ea typeface="+mn-ea"/>
-          <a:cs typeface="+mn-cs"/>
-        </a:defRPr>
-      </a:lvl2pPr>
-      <a:lvl3pPr marL="1143000" indent="-228600" algn="l" defTabSz="914400" rtl="0" eaLnBrk="1" latinLnBrk="0" hangingPunct="1">
-        <a:lnSpc>
-          <a:spcPct val="90000"/>
-        </a:lnSpc>
-        <a:spcBef>
-          <a:spcPts val="500"/>
-        </a:spcBef>
-        <a:buFont typeface="Arial" panose="020B0604020202020204" pitchFamily="34" charset="0"/>
-        <a:buChar char="•"/>
-        <a:defRPr sz="2000" kern="1200">
-          <a:solidFill>
-            <a:schemeClr val="tx1"/>
-          </a:solidFill>
-          <a:latin typeface="+mn-lt"/>
-          <a:ea typeface="+mn-ea"/>
-          <a:cs typeface="+mn-cs"/>
-        </a:defRPr>
-      </a:lvl3pPr>
-      <a:lvl4pPr marL="1600200" indent="-228600" algn="l" defTabSz="914400" rtl="0" eaLnBrk="1" latinLnBrk="0" hangingPunct="1">
-        <a:lnSpc>
-          <a:spcPct val="90000"/>
-        </a:lnSpc>
-        <a:spcBef>
-          <a:spcPts val="500"/>
+          <a:spcPts val="375"/>
         </a:spcBef>
         <a:buFont typeface="Arial" panose="020B0604020202020204" pitchFamily="34" charset="0"/>
         <a:buChar char="•"/>
@@ -2763,17 +2730,53 @@
           <a:ea typeface="+mn-ea"/>
           <a:cs typeface="+mn-cs"/>
         </a:defRPr>
-      </a:lvl4pPr>
-      <a:lvl5pPr marL="2057400" indent="-228600" algn="l" defTabSz="914400" rtl="0" eaLnBrk="1" latinLnBrk="0" hangingPunct="1">
+      </a:lvl2pPr>
+      <a:lvl3pPr marL="857250" indent="-171450" algn="l" defTabSz="685800" rtl="0" eaLnBrk="1" latinLnBrk="0" hangingPunct="1">
         <a:lnSpc>
           <a:spcPct val="90000"/>
         </a:lnSpc>
         <a:spcBef>
-          <a:spcPts val="500"/>
+          <a:spcPts val="375"/>
         </a:spcBef>
         <a:buFont typeface="Arial" panose="020B0604020202020204" pitchFamily="34" charset="0"/>
         <a:buChar char="•"/>
-        <a:defRPr sz="1800" kern="1200">
+        <a:defRPr sz="1500" kern="1200">
+          <a:solidFill>
+            <a:schemeClr val="tx1"/>
+          </a:solidFill>
+          <a:latin typeface="+mn-lt"/>
+          <a:ea typeface="+mn-ea"/>
+          <a:cs typeface="+mn-cs"/>
+        </a:defRPr>
+      </a:lvl3pPr>
+      <a:lvl4pPr marL="1200150" indent="-171450" algn="l" defTabSz="685800" rtl="0" eaLnBrk="1" latinLnBrk="0" hangingPunct="1">
+        <a:lnSpc>
+          <a:spcPct val="90000"/>
+        </a:lnSpc>
+        <a:spcBef>
+          <a:spcPts val="375"/>
+        </a:spcBef>
+        <a:buFont typeface="Arial" panose="020B0604020202020204" pitchFamily="34" charset="0"/>
+        <a:buChar char="•"/>
+        <a:defRPr sz="1350" kern="1200">
+          <a:solidFill>
+            <a:schemeClr val="tx1"/>
+          </a:solidFill>
+          <a:latin typeface="+mn-lt"/>
+          <a:ea typeface="+mn-ea"/>
+          <a:cs typeface="+mn-cs"/>
+        </a:defRPr>
+      </a:lvl4pPr>
+      <a:lvl5pPr marL="1543050" indent="-171450" algn="l" defTabSz="685800" rtl="0" eaLnBrk="1" latinLnBrk="0" hangingPunct="1">
+        <a:lnSpc>
+          <a:spcPct val="90000"/>
+        </a:lnSpc>
+        <a:spcBef>
+          <a:spcPts val="375"/>
+        </a:spcBef>
+        <a:buFont typeface="Arial" panose="020B0604020202020204" pitchFamily="34" charset="0"/>
+        <a:buChar char="•"/>
+        <a:defRPr sz="1350" kern="1200">
           <a:solidFill>
             <a:schemeClr val="tx1"/>
           </a:solidFill>
@@ -2782,16 +2785,16 @@
           <a:cs typeface="+mn-cs"/>
         </a:defRPr>
       </a:lvl5pPr>
-      <a:lvl6pPr marL="2514600" indent="-228600" algn="l" defTabSz="914400" rtl="0" eaLnBrk="1" latinLnBrk="0" hangingPunct="1">
+      <a:lvl6pPr marL="1885950" indent="-171450" algn="l" defTabSz="685800" rtl="0" eaLnBrk="1" latinLnBrk="0" hangingPunct="1">
         <a:lnSpc>
           <a:spcPct val="90000"/>
         </a:lnSpc>
         <a:spcBef>
-          <a:spcPts val="500"/>
+          <a:spcPts val="375"/>
         </a:spcBef>
         <a:buFont typeface="Arial" panose="020B0604020202020204" pitchFamily="34" charset="0"/>
         <a:buChar char="•"/>
-        <a:defRPr sz="1800" kern="1200">
+        <a:defRPr sz="1350" kern="1200">
           <a:solidFill>
             <a:schemeClr val="tx1"/>
           </a:solidFill>
@@ -2800,16 +2803,16 @@
           <a:cs typeface="+mn-cs"/>
         </a:defRPr>
       </a:lvl6pPr>
-      <a:lvl7pPr marL="2971800" indent="-228600" algn="l" defTabSz="914400" rtl="0" eaLnBrk="1" latinLnBrk="0" hangingPunct="1">
+      <a:lvl7pPr marL="2228850" indent="-171450" algn="l" defTabSz="685800" rtl="0" eaLnBrk="1" latinLnBrk="0" hangingPunct="1">
         <a:lnSpc>
           <a:spcPct val="90000"/>
         </a:lnSpc>
         <a:spcBef>
-          <a:spcPts val="500"/>
+          <a:spcPts val="375"/>
         </a:spcBef>
         <a:buFont typeface="Arial" panose="020B0604020202020204" pitchFamily="34" charset="0"/>
         <a:buChar char="•"/>
-        <a:defRPr sz="1800" kern="1200">
+        <a:defRPr sz="1350" kern="1200">
           <a:solidFill>
             <a:schemeClr val="tx1"/>
           </a:solidFill>
@@ -2818,16 +2821,16 @@
           <a:cs typeface="+mn-cs"/>
         </a:defRPr>
       </a:lvl7pPr>
-      <a:lvl8pPr marL="3429000" indent="-228600" algn="l" defTabSz="914400" rtl="0" eaLnBrk="1" latinLnBrk="0" hangingPunct="1">
+      <a:lvl8pPr marL="2571750" indent="-171450" algn="l" defTabSz="685800" rtl="0" eaLnBrk="1" latinLnBrk="0" hangingPunct="1">
         <a:lnSpc>
           <a:spcPct val="90000"/>
         </a:lnSpc>
         <a:spcBef>
-          <a:spcPts val="500"/>
+          <a:spcPts val="375"/>
         </a:spcBef>
         <a:buFont typeface="Arial" panose="020B0604020202020204" pitchFamily="34" charset="0"/>
         <a:buChar char="•"/>
-        <a:defRPr sz="1800" kern="1200">
+        <a:defRPr sz="1350" kern="1200">
           <a:solidFill>
             <a:schemeClr val="tx1"/>
           </a:solidFill>
@@ -2836,16 +2839,16 @@
           <a:cs typeface="+mn-cs"/>
         </a:defRPr>
       </a:lvl8pPr>
-      <a:lvl9pPr marL="3886200" indent="-228600" algn="l" defTabSz="914400" rtl="0" eaLnBrk="1" latinLnBrk="0" hangingPunct="1">
+      <a:lvl9pPr marL="2914650" indent="-171450" algn="l" defTabSz="685800" rtl="0" eaLnBrk="1" latinLnBrk="0" hangingPunct="1">
         <a:lnSpc>
           <a:spcPct val="90000"/>
         </a:lnSpc>
         <a:spcBef>
-          <a:spcPts val="500"/>
+          <a:spcPts val="375"/>
         </a:spcBef>
         <a:buFont typeface="Arial" panose="020B0604020202020204" pitchFamily="34" charset="0"/>
         <a:buChar char="•"/>
-        <a:defRPr sz="1800" kern="1200">
+        <a:defRPr sz="1350" kern="1200">
           <a:solidFill>
             <a:schemeClr val="tx1"/>
           </a:solidFill>
@@ -2859,8 +2862,8 @@
       <a:defPPr>
         <a:defRPr lang="en-US"/>
       </a:defPPr>
-      <a:lvl1pPr marL="0" algn="l" defTabSz="914400" rtl="0" eaLnBrk="1" latinLnBrk="0" hangingPunct="1">
-        <a:defRPr sz="1800" kern="1200">
+      <a:lvl1pPr marL="0" algn="l" defTabSz="685800" rtl="0" eaLnBrk="1" latinLnBrk="0" hangingPunct="1">
+        <a:defRPr sz="1350" kern="1200">
           <a:solidFill>
             <a:schemeClr val="tx1"/>
           </a:solidFill>
@@ -2869,8 +2872,8 @@
           <a:cs typeface="+mn-cs"/>
         </a:defRPr>
       </a:lvl1pPr>
-      <a:lvl2pPr marL="457200" algn="l" defTabSz="914400" rtl="0" eaLnBrk="1" latinLnBrk="0" hangingPunct="1">
-        <a:defRPr sz="1800" kern="1200">
+      <a:lvl2pPr marL="342900" algn="l" defTabSz="685800" rtl="0" eaLnBrk="1" latinLnBrk="0" hangingPunct="1">
+        <a:defRPr sz="1350" kern="1200">
           <a:solidFill>
             <a:schemeClr val="tx1"/>
           </a:solidFill>
@@ -2879,8 +2882,8 @@
           <a:cs typeface="+mn-cs"/>
         </a:defRPr>
       </a:lvl2pPr>
-      <a:lvl3pPr marL="914400" algn="l" defTabSz="914400" rtl="0" eaLnBrk="1" latinLnBrk="0" hangingPunct="1">
-        <a:defRPr sz="1800" kern="1200">
+      <a:lvl3pPr marL="685800" algn="l" defTabSz="685800" rtl="0" eaLnBrk="1" latinLnBrk="0" hangingPunct="1">
+        <a:defRPr sz="1350" kern="1200">
           <a:solidFill>
             <a:schemeClr val="tx1"/>
           </a:solidFill>
@@ -2889,8 +2892,8 @@
           <a:cs typeface="+mn-cs"/>
         </a:defRPr>
       </a:lvl3pPr>
-      <a:lvl4pPr marL="1371600" algn="l" defTabSz="914400" rtl="0" eaLnBrk="1" latinLnBrk="0" hangingPunct="1">
-        <a:defRPr sz="1800" kern="1200">
+      <a:lvl4pPr marL="1028700" algn="l" defTabSz="685800" rtl="0" eaLnBrk="1" latinLnBrk="0" hangingPunct="1">
+        <a:defRPr sz="1350" kern="1200">
           <a:solidFill>
             <a:schemeClr val="tx1"/>
           </a:solidFill>
@@ -2899,8 +2902,8 @@
           <a:cs typeface="+mn-cs"/>
         </a:defRPr>
       </a:lvl4pPr>
-      <a:lvl5pPr marL="1828800" algn="l" defTabSz="914400" rtl="0" eaLnBrk="1" latinLnBrk="0" hangingPunct="1">
-        <a:defRPr sz="1800" kern="1200">
+      <a:lvl5pPr marL="1371600" algn="l" defTabSz="685800" rtl="0" eaLnBrk="1" latinLnBrk="0" hangingPunct="1">
+        <a:defRPr sz="1350" kern="1200">
           <a:solidFill>
             <a:schemeClr val="tx1"/>
           </a:solidFill>
@@ -2909,8 +2912,8 @@
           <a:cs typeface="+mn-cs"/>
         </a:defRPr>
       </a:lvl5pPr>
-      <a:lvl6pPr marL="2286000" algn="l" defTabSz="914400" rtl="0" eaLnBrk="1" latinLnBrk="0" hangingPunct="1">
-        <a:defRPr sz="1800" kern="1200">
+      <a:lvl6pPr marL="1714500" algn="l" defTabSz="685800" rtl="0" eaLnBrk="1" latinLnBrk="0" hangingPunct="1">
+        <a:defRPr sz="1350" kern="1200">
           <a:solidFill>
             <a:schemeClr val="tx1"/>
           </a:solidFill>
@@ -2919,8 +2922,8 @@
           <a:cs typeface="+mn-cs"/>
         </a:defRPr>
       </a:lvl6pPr>
-      <a:lvl7pPr marL="2743200" algn="l" defTabSz="914400" rtl="0" eaLnBrk="1" latinLnBrk="0" hangingPunct="1">
-        <a:defRPr sz="1800" kern="1200">
+      <a:lvl7pPr marL="2057400" algn="l" defTabSz="685800" rtl="0" eaLnBrk="1" latinLnBrk="0" hangingPunct="1">
+        <a:defRPr sz="1350" kern="1200">
           <a:solidFill>
             <a:schemeClr val="tx1"/>
           </a:solidFill>
@@ -2929,8 +2932,8 @@
           <a:cs typeface="+mn-cs"/>
         </a:defRPr>
       </a:lvl7pPr>
-      <a:lvl8pPr marL="3200400" algn="l" defTabSz="914400" rtl="0" eaLnBrk="1" latinLnBrk="0" hangingPunct="1">
-        <a:defRPr sz="1800" kern="1200">
+      <a:lvl8pPr marL="2400300" algn="l" defTabSz="685800" rtl="0" eaLnBrk="1" latinLnBrk="0" hangingPunct="1">
+        <a:defRPr sz="1350" kern="1200">
           <a:solidFill>
             <a:schemeClr val="tx1"/>
           </a:solidFill>
@@ -2939,8 +2942,8 @@
           <a:cs typeface="+mn-cs"/>
         </a:defRPr>
       </a:lvl8pPr>
-      <a:lvl9pPr marL="3657600" algn="l" defTabSz="914400" rtl="0" eaLnBrk="1" latinLnBrk="0" hangingPunct="1">
-        <a:defRPr sz="1800" kern="1200">
+      <a:lvl9pPr marL="2743200" algn="l" defTabSz="685800" rtl="0" eaLnBrk="1" latinLnBrk="0" hangingPunct="1">
+        <a:defRPr sz="1350" kern="1200">
           <a:solidFill>
             <a:schemeClr val="tx1"/>
           </a:solidFill>
@@ -2985,7 +2988,7 @@
         </p:nvSpPr>
         <p:spPr>
           <a:xfrm>
-            <a:off x="3657600" y="2538984"/>
+            <a:off x="3657600" y="1967484"/>
             <a:ext cx="1828800" cy="1780032"/>
           </a:xfrm>
           <a:prstGeom prst="roundRect">
@@ -3041,7 +3044,7 @@
         </p:nvSpPr>
         <p:spPr>
           <a:xfrm>
-            <a:off x="94488" y="2538984"/>
+            <a:off x="94488" y="1967484"/>
             <a:ext cx="1828800" cy="1780032"/>
           </a:xfrm>
           <a:prstGeom prst="roundRect">
@@ -3090,7 +3093,7 @@
         </p:nvSpPr>
         <p:spPr>
           <a:xfrm>
-            <a:off x="7220712" y="2538984"/>
+            <a:off x="7220712" y="1967484"/>
             <a:ext cx="1828800" cy="1780032"/>
           </a:xfrm>
           <a:prstGeom prst="roundRect">
@@ -3142,7 +3145,7 @@
         </p:nvCxnSpPr>
         <p:spPr>
           <a:xfrm>
-            <a:off x="1923288" y="3429000"/>
+            <a:off x="1923288" y="2857500"/>
             <a:ext cx="1734312" cy="0"/>
           </a:xfrm>
           <a:prstGeom prst="straightConnector1">
@@ -3184,7 +3187,7 @@
         </p:nvCxnSpPr>
         <p:spPr>
           <a:xfrm>
-            <a:off x="5486400" y="3429000"/>
+            <a:off x="5486400" y="2857500"/>
             <a:ext cx="1734312" cy="0"/>
           </a:xfrm>
           <a:prstGeom prst="straightConnector1">
@@ -3223,7 +3226,7 @@
         </p:nvSpPr>
         <p:spPr>
           <a:xfrm>
-            <a:off x="5454111" y="3429000"/>
+            <a:off x="5454111" y="2857501"/>
             <a:ext cx="1798890" cy="276999"/>
           </a:xfrm>
           <a:prstGeom prst="rect">
@@ -3265,7 +3268,7 @@
         </p:nvSpPr>
         <p:spPr>
           <a:xfrm>
-            <a:off x="5708988" y="3126278"/>
+            <a:off x="5708989" y="2554779"/>
             <a:ext cx="1289135" cy="276999"/>
           </a:xfrm>
           <a:prstGeom prst="rect">
@@ -3307,7 +3310,7 @@
         </p:nvSpPr>
         <p:spPr>
           <a:xfrm>
-            <a:off x="2358274" y="2485092"/>
+            <a:off x="2358275" y="1913593"/>
             <a:ext cx="864339" cy="276999"/>
           </a:xfrm>
           <a:prstGeom prst="rect">
@@ -3345,7 +3348,7 @@
         </p:nvSpPr>
         <p:spPr>
           <a:xfrm>
-            <a:off x="2314268" y="2748191"/>
+            <a:off x="2314269" y="2176692"/>
             <a:ext cx="949299" cy="276999"/>
           </a:xfrm>
           <a:prstGeom prst="rect">
@@ -3383,7 +3386,7 @@
         </p:nvSpPr>
         <p:spPr>
           <a:xfrm>
-            <a:off x="1933478" y="3050313"/>
+            <a:off x="1933479" y="2478814"/>
             <a:ext cx="1713931" cy="276999"/>
           </a:xfrm>
           <a:prstGeom prst="rect">
@@ -3425,7 +3428,7 @@
         </p:nvSpPr>
         <p:spPr>
           <a:xfrm>
-            <a:off x="1942116" y="3748207"/>
+            <a:off x="1942117" y="3176708"/>
             <a:ext cx="1693605" cy="307777"/>
           </a:xfrm>
           <a:prstGeom prst="rect">
@@ -3462,7 +3465,7 @@
         </p:nvSpPr>
         <p:spPr>
           <a:xfrm>
-            <a:off x="2101872" y="3451444"/>
+            <a:off x="2101872" y="2879945"/>
             <a:ext cx="1374094" cy="276999"/>
           </a:xfrm>
           <a:prstGeom prst="rect">
@@ -3507,7 +3510,7 @@
         </p:nvCxnSpPr>
         <p:spPr>
           <a:xfrm rot="5400000">
-            <a:off x="6353556" y="2537460"/>
+            <a:off x="6353556" y="1965960"/>
             <a:ext cx="12700" cy="3563112"/>
           </a:xfrm>
           <a:prstGeom prst="bentConnector3">
@@ -3548,7 +3551,7 @@
         </p:nvSpPr>
         <p:spPr>
           <a:xfrm>
-            <a:off x="5044607" y="4431516"/>
+            <a:off x="5044607" y="3860017"/>
             <a:ext cx="2617896" cy="307777"/>
           </a:xfrm>
           <a:prstGeom prst="rect">
@@ -3576,6 +3579,1420 @@
     <p:extLst>
       <p:ext uri="{BB962C8B-B14F-4D97-AF65-F5344CB8AC3E}">
         <p14:creationId xmlns:p14="http://schemas.microsoft.com/office/powerpoint/2010/main" val="2126936355"/>
+      </p:ext>
+    </p:extLst>
+  </p:cSld>
+  <p:clrMapOvr>
+    <a:masterClrMapping/>
+  </p:clrMapOvr>
+</p:sld>
+</file>
+
+<file path=ppt/slides/slide2.xml><?xml version="1.0" encoding="utf-8"?>
+<p:sld xmlns:a="http://schemas.openxmlformats.org/drawingml/2006/main" xmlns:r="http://schemas.openxmlformats.org/officeDocument/2006/relationships" xmlns:p="http://schemas.openxmlformats.org/presentationml/2006/main">
+  <p:cSld>
+    <p:spTree>
+      <p:nvGrpSpPr>
+        <p:cNvPr id="1" name=""/>
+        <p:cNvGrpSpPr/>
+        <p:nvPr/>
+      </p:nvGrpSpPr>
+      <p:grpSpPr>
+        <a:xfrm>
+          <a:off x="0" y="0"/>
+          <a:ext cx="0" cy="0"/>
+          <a:chOff x="0" y="0"/>
+          <a:chExt cx="0" cy="0"/>
+        </a:xfrm>
+      </p:grpSpPr>
+      <p:grpSp>
+        <p:nvGrpSpPr>
+          <p:cNvPr id="92" name="Group 91">
+            <a:extLst>
+              <a:ext uri="{FF2B5EF4-FFF2-40B4-BE49-F238E27FC236}">
+                <a16:creationId xmlns:a16="http://schemas.microsoft.com/office/drawing/2014/main" id="{5F7A491C-2F0E-434A-A100-5960D50458E7}"/>
+              </a:ext>
+            </a:extLst>
+          </p:cNvPr>
+          <p:cNvGrpSpPr/>
+          <p:nvPr/>
+        </p:nvGrpSpPr>
+        <p:grpSpPr>
+          <a:xfrm>
+            <a:off x="500979" y="907581"/>
+            <a:ext cx="8142041" cy="3899838"/>
+            <a:chOff x="201519" y="783138"/>
+            <a:chExt cx="8142041" cy="3899838"/>
+          </a:xfrm>
+        </p:grpSpPr>
+        <p:sp>
+          <p:nvSpPr>
+            <p:cNvPr id="4" name="Rounded Rectangle 3">
+              <a:extLst>
+                <a:ext uri="{FF2B5EF4-FFF2-40B4-BE49-F238E27FC236}">
+                  <a16:creationId xmlns:a16="http://schemas.microsoft.com/office/drawing/2014/main" id="{B22F12CC-E5BF-9D4D-8A10-5BA126C690B8}"/>
+                </a:ext>
+              </a:extLst>
+            </p:cNvPr>
+            <p:cNvSpPr/>
+            <p:nvPr/>
+          </p:nvSpPr>
+          <p:spPr>
+            <a:xfrm>
+              <a:off x="3811324" y="3792442"/>
+              <a:ext cx="1673290" cy="785876"/>
+            </a:xfrm>
+            <a:prstGeom prst="roundRect">
+              <a:avLst/>
+            </a:prstGeom>
+          </p:spPr>
+          <p:style>
+            <a:lnRef idx="2">
+              <a:schemeClr val="accent5">
+                <a:shade val="50000"/>
+              </a:schemeClr>
+            </a:lnRef>
+            <a:fillRef idx="1">
+              <a:schemeClr val="accent5"/>
+            </a:fillRef>
+            <a:effectRef idx="0">
+              <a:schemeClr val="accent5"/>
+            </a:effectRef>
+            <a:fontRef idx="minor">
+              <a:schemeClr val="lt1"/>
+            </a:fontRef>
+          </p:style>
+          <p:txBody>
+            <a:bodyPr rtlCol="0" anchor="ctr"/>
+            <a:lstStyle/>
+            <a:p>
+              <a:pPr algn="ctr"/>
+              <a:r>
+                <a:rPr lang="en-US" sz="1400" dirty="0"/>
+                <a:t>Decision and Control</a:t>
+              </a:r>
+            </a:p>
+            <a:p>
+              <a:pPr algn="ctr"/>
+              <a:r>
+                <a:rPr lang="en-US" sz="1400" dirty="0"/>
+                <a:t>(User provided)</a:t>
+              </a:r>
+            </a:p>
+          </p:txBody>
+        </p:sp>
+        <p:sp>
+          <p:nvSpPr>
+            <p:cNvPr id="5" name="Rounded Rectangle 4">
+              <a:extLst>
+                <a:ext uri="{FF2B5EF4-FFF2-40B4-BE49-F238E27FC236}">
+                  <a16:creationId xmlns:a16="http://schemas.microsoft.com/office/drawing/2014/main" id="{C2C07D91-AAD2-6847-8849-ED7AF168670D}"/>
+                </a:ext>
+              </a:extLst>
+            </p:cNvPr>
+            <p:cNvSpPr/>
+            <p:nvPr/>
+          </p:nvSpPr>
+          <p:spPr>
+            <a:xfrm>
+              <a:off x="705478" y="3792442"/>
+              <a:ext cx="1673290" cy="785876"/>
+            </a:xfrm>
+            <a:prstGeom prst="roundRect">
+              <a:avLst/>
+            </a:prstGeom>
+          </p:spPr>
+          <p:style>
+            <a:lnRef idx="2">
+              <a:schemeClr val="accent6">
+                <a:shade val="50000"/>
+              </a:schemeClr>
+            </a:lnRef>
+            <a:fillRef idx="1">
+              <a:schemeClr val="accent6"/>
+            </a:fillRef>
+            <a:effectRef idx="0">
+              <a:schemeClr val="accent6"/>
+            </a:effectRef>
+            <a:fontRef idx="minor">
+              <a:schemeClr val="lt1"/>
+            </a:fontRef>
+          </p:style>
+          <p:txBody>
+            <a:bodyPr rtlCol="0" anchor="ctr"/>
+            <a:lstStyle/>
+            <a:p>
+              <a:pPr algn="ctr"/>
+              <a:r>
+                <a:rPr lang="en-US" sz="1400" dirty="0"/>
+                <a:t>Perception</a:t>
+              </a:r>
+              <a:endParaRPr lang="en-US" sz="2400" dirty="0"/>
+            </a:p>
+          </p:txBody>
+        </p:sp>
+        <p:sp>
+          <p:nvSpPr>
+            <p:cNvPr id="15" name="TextBox 14">
+              <a:extLst>
+                <a:ext uri="{FF2B5EF4-FFF2-40B4-BE49-F238E27FC236}">
+                  <a16:creationId xmlns:a16="http://schemas.microsoft.com/office/drawing/2014/main" id="{9E167551-09E9-AE4D-BA27-695B3DCF70F1}"/>
+                </a:ext>
+              </a:extLst>
+            </p:cNvPr>
+            <p:cNvSpPr txBox="1"/>
+            <p:nvPr/>
+          </p:nvSpPr>
+          <p:spPr>
+            <a:xfrm>
+              <a:off x="2658944" y="3898888"/>
+              <a:ext cx="864339" cy="276999"/>
+            </a:xfrm>
+            <a:prstGeom prst="rect">
+              <a:avLst/>
+            </a:prstGeom>
+            <a:noFill/>
+          </p:spPr>
+          <p:txBody>
+            <a:bodyPr wrap="square" rtlCol="0">
+              <a:spAutoFit/>
+            </a:bodyPr>
+            <a:lstStyle/>
+            <a:p>
+              <a:r>
+                <a:rPr lang="en-US" sz="1200" dirty="0">
+                  <a:latin typeface="Consolas" panose="020B0609020204030204" pitchFamily="49" charset="0"/>
+                  <a:cs typeface="Consolas" panose="020B0609020204030204" pitchFamily="49" charset="0"/>
+                </a:rPr>
+                <a:t>location</a:t>
+              </a:r>
+            </a:p>
+          </p:txBody>
+        </p:sp>
+        <p:sp>
+          <p:nvSpPr>
+            <p:cNvPr id="16" name="TextBox 15">
+              <a:extLst>
+                <a:ext uri="{FF2B5EF4-FFF2-40B4-BE49-F238E27FC236}">
+                  <a16:creationId xmlns:a16="http://schemas.microsoft.com/office/drawing/2014/main" id="{B8518B94-B527-AA45-B6FC-9343DD67CBE3}"/>
+                </a:ext>
+              </a:extLst>
+            </p:cNvPr>
+            <p:cNvSpPr txBox="1"/>
+            <p:nvPr/>
+          </p:nvSpPr>
+          <p:spPr>
+            <a:xfrm>
+              <a:off x="2616465" y="4189553"/>
+              <a:ext cx="949299" cy="276999"/>
+            </a:xfrm>
+            <a:prstGeom prst="rect">
+              <a:avLst/>
+            </a:prstGeom>
+            <a:noFill/>
+          </p:spPr>
+          <p:txBody>
+            <a:bodyPr wrap="square" rtlCol="0">
+              <a:spAutoFit/>
+            </a:bodyPr>
+            <a:lstStyle/>
+            <a:p>
+              <a:r>
+                <a:rPr lang="en-US" sz="1200" dirty="0">
+                  <a:latin typeface="Consolas" panose="020B0609020204030204" pitchFamily="49" charset="0"/>
+                  <a:cs typeface="Consolas" panose="020B0609020204030204" pitchFamily="49" charset="0"/>
+                </a:rPr>
+                <a:t>obstacles</a:t>
+              </a:r>
+            </a:p>
+          </p:txBody>
+        </p:sp>
+        <p:sp>
+          <p:nvSpPr>
+            <p:cNvPr id="17" name="TextBox 16">
+              <a:extLst>
+                <a:ext uri="{FF2B5EF4-FFF2-40B4-BE49-F238E27FC236}">
+                  <a16:creationId xmlns:a16="http://schemas.microsoft.com/office/drawing/2014/main" id="{FB0A7959-D9D0-2B4A-B47F-372C71B80D46}"/>
+                </a:ext>
+              </a:extLst>
+            </p:cNvPr>
+            <p:cNvSpPr txBox="1"/>
+            <p:nvPr/>
+          </p:nvSpPr>
+          <p:spPr>
+            <a:xfrm>
+              <a:off x="2407999" y="4405977"/>
+              <a:ext cx="1374094" cy="276999"/>
+            </a:xfrm>
+            <a:prstGeom prst="rect">
+              <a:avLst/>
+            </a:prstGeom>
+            <a:noFill/>
+          </p:spPr>
+          <p:txBody>
+            <a:bodyPr wrap="square" rtlCol="0">
+              <a:spAutoFit/>
+            </a:bodyPr>
+            <a:lstStyle/>
+            <a:p>
+              <a:r>
+                <a:rPr lang="en-US" sz="1200" dirty="0" err="1">
+                  <a:latin typeface="Consolas" panose="020B0609020204030204" pitchFamily="49" charset="0"/>
+                  <a:cs typeface="Consolas" panose="020B0609020204030204" pitchFamily="49" charset="0"/>
+                </a:rPr>
+                <a:t>lane_waypoints</a:t>
+              </a:r>
+              <a:endParaRPr lang="en-US" sz="1200" dirty="0">
+                <a:latin typeface="Consolas" panose="020B0609020204030204" pitchFamily="49" charset="0"/>
+                <a:cs typeface="Consolas" panose="020B0609020204030204" pitchFamily="49" charset="0"/>
+              </a:endParaRPr>
+            </a:p>
+          </p:txBody>
+        </p:sp>
+        <p:sp>
+          <p:nvSpPr>
+            <p:cNvPr id="31" name="L-Shape 30">
+              <a:extLst>
+                <a:ext uri="{FF2B5EF4-FFF2-40B4-BE49-F238E27FC236}">
+                  <a16:creationId xmlns:a16="http://schemas.microsoft.com/office/drawing/2014/main" id="{967E4A72-AF34-AC44-B955-1822563CF597}"/>
+                </a:ext>
+              </a:extLst>
+            </p:cNvPr>
+            <p:cNvSpPr/>
+            <p:nvPr/>
+          </p:nvSpPr>
+          <p:spPr>
+            <a:xfrm rot="10800000">
+              <a:off x="3373848" y="1816111"/>
+              <a:ext cx="4969530" cy="2857371"/>
+            </a:xfrm>
+            <a:prstGeom prst="corner">
+              <a:avLst>
+                <a:gd name="adj1" fmla="val 34242"/>
+                <a:gd name="adj2" fmla="val 65390"/>
+              </a:avLst>
+            </a:prstGeom>
+          </p:spPr>
+          <p:style>
+            <a:lnRef idx="1">
+              <a:schemeClr val="accent4"/>
+            </a:lnRef>
+            <a:fillRef idx="2">
+              <a:schemeClr val="accent4"/>
+            </a:fillRef>
+            <a:effectRef idx="1">
+              <a:schemeClr val="accent4"/>
+            </a:effectRef>
+            <a:fontRef idx="minor">
+              <a:schemeClr val="dk1"/>
+            </a:fontRef>
+          </p:style>
+          <p:txBody>
+            <a:bodyPr rtlCol="0" anchor="ctr"/>
+            <a:lstStyle/>
+            <a:p>
+              <a:pPr algn="ctr"/>
+              <a:endParaRPr lang="en-US"/>
+            </a:p>
+          </p:txBody>
+        </p:sp>
+        <p:sp>
+          <p:nvSpPr>
+            <p:cNvPr id="6" name="Rounded Rectangle 5">
+              <a:extLst>
+                <a:ext uri="{FF2B5EF4-FFF2-40B4-BE49-F238E27FC236}">
+                  <a16:creationId xmlns:a16="http://schemas.microsoft.com/office/drawing/2014/main" id="{89D4FBAF-9E68-5944-BDB2-7FE0346A9239}"/>
+                </a:ext>
+              </a:extLst>
+            </p:cNvPr>
+            <p:cNvSpPr/>
+            <p:nvPr/>
+          </p:nvSpPr>
+          <p:spPr>
+            <a:xfrm>
+              <a:off x="6581272" y="3792442"/>
+              <a:ext cx="1673290" cy="789603"/>
+            </a:xfrm>
+            <a:prstGeom prst="roundRect">
+              <a:avLst/>
+            </a:prstGeom>
+          </p:spPr>
+          <p:style>
+            <a:lnRef idx="2">
+              <a:schemeClr val="accent6">
+                <a:shade val="50000"/>
+              </a:schemeClr>
+            </a:lnRef>
+            <a:fillRef idx="1">
+              <a:schemeClr val="accent6"/>
+            </a:fillRef>
+            <a:effectRef idx="0">
+              <a:schemeClr val="accent6"/>
+            </a:effectRef>
+            <a:fontRef idx="minor">
+              <a:schemeClr val="lt1"/>
+            </a:fontRef>
+          </p:style>
+          <p:txBody>
+            <a:bodyPr rtlCol="0" anchor="ctr"/>
+            <a:lstStyle/>
+            <a:p>
+              <a:pPr algn="ctr"/>
+              <a:r>
+                <a:rPr lang="en-US" sz="1050" dirty="0" err="1">
+                  <a:latin typeface="Consolas" panose="020B0609020204030204" pitchFamily="49" charset="0"/>
+                  <a:cs typeface="Consolas" panose="020B0609020204030204" pitchFamily="49" charset="0"/>
+                </a:rPr>
+                <a:t>ackermann_cmd</a:t>
+              </a:r>
+              <a:endParaRPr lang="en-US" sz="1050" dirty="0">
+                <a:latin typeface="Consolas" panose="020B0609020204030204" pitchFamily="49" charset="0"/>
+                <a:cs typeface="Consolas" panose="020B0609020204030204" pitchFamily="49" charset="0"/>
+              </a:endParaRPr>
+            </a:p>
+            <a:p>
+              <a:pPr algn="ctr"/>
+              <a:r>
+                <a:rPr lang="en-US" sz="1200" dirty="0">
+                  <a:latin typeface="Calibri" panose="020F0502020204030204" pitchFamily="34" charset="0"/>
+                  <a:cs typeface="Calibri" panose="020F0502020204030204" pitchFamily="34" charset="0"/>
+                </a:rPr>
+                <a:t>or</a:t>
+              </a:r>
+            </a:p>
+            <a:p>
+              <a:pPr algn="ctr"/>
+              <a:r>
+                <a:rPr lang="en-US" sz="1050" dirty="0" err="1">
+                  <a:latin typeface="Consolas" panose="020B0609020204030204" pitchFamily="49" charset="0"/>
+                  <a:cs typeface="Consolas" panose="020B0609020204030204" pitchFamily="49" charset="0"/>
+                </a:rPr>
+                <a:t>vehicle_control_cmd</a:t>
+              </a:r>
+              <a:endParaRPr lang="en-US" sz="1050" dirty="0">
+                <a:latin typeface="Consolas" panose="020B0609020204030204" pitchFamily="49" charset="0"/>
+                <a:cs typeface="Consolas" panose="020B0609020204030204" pitchFamily="49" charset="0"/>
+              </a:endParaRPr>
+            </a:p>
+          </p:txBody>
+        </p:sp>
+        <p:sp>
+          <p:nvSpPr>
+            <p:cNvPr id="34" name="Diamond 33">
+              <a:extLst>
+                <a:ext uri="{FF2B5EF4-FFF2-40B4-BE49-F238E27FC236}">
+                  <a16:creationId xmlns:a16="http://schemas.microsoft.com/office/drawing/2014/main" id="{9248CA5C-05AA-954C-9F7D-B7D61F205834}"/>
+                </a:ext>
+              </a:extLst>
+            </p:cNvPr>
+            <p:cNvSpPr/>
+            <p:nvPr/>
+          </p:nvSpPr>
+          <p:spPr>
+            <a:xfrm>
+              <a:off x="6786558" y="2817816"/>
+              <a:ext cx="1262718" cy="628192"/>
+            </a:xfrm>
+            <a:prstGeom prst="diamond">
+              <a:avLst/>
+            </a:prstGeom>
+          </p:spPr>
+          <p:style>
+            <a:lnRef idx="2">
+              <a:schemeClr val="dk1"/>
+            </a:lnRef>
+            <a:fillRef idx="1">
+              <a:schemeClr val="lt1"/>
+            </a:fillRef>
+            <a:effectRef idx="0">
+              <a:schemeClr val="dk1"/>
+            </a:effectRef>
+            <a:fontRef idx="minor">
+              <a:schemeClr val="dk1"/>
+            </a:fontRef>
+          </p:style>
+          <p:txBody>
+            <a:bodyPr rtlCol="0" anchor="ctr"/>
+            <a:lstStyle/>
+            <a:p>
+              <a:pPr algn="ctr"/>
+              <a:r>
+                <a:rPr lang="en-US" sz="1200" dirty="0"/>
+                <a:t>Model based?</a:t>
+              </a:r>
+            </a:p>
+          </p:txBody>
+        </p:sp>
+        <p:sp>
+          <p:nvSpPr>
+            <p:cNvPr id="35" name="Rounded Rectangle 34">
+              <a:extLst>
+                <a:ext uri="{FF2B5EF4-FFF2-40B4-BE49-F238E27FC236}">
+                  <a16:creationId xmlns:a16="http://schemas.microsoft.com/office/drawing/2014/main" id="{37DA2C2C-DD9D-2A45-9E5C-FF06D2290FF9}"/>
+                </a:ext>
+              </a:extLst>
+            </p:cNvPr>
+            <p:cNvSpPr/>
+            <p:nvPr/>
+          </p:nvSpPr>
+          <p:spPr>
+            <a:xfrm>
+              <a:off x="3473391" y="1922430"/>
+              <a:ext cx="1262718" cy="785876"/>
+            </a:xfrm>
+            <a:prstGeom prst="roundRect">
+              <a:avLst/>
+            </a:prstGeom>
+          </p:spPr>
+          <p:style>
+            <a:lnRef idx="2">
+              <a:schemeClr val="accent2">
+                <a:shade val="50000"/>
+              </a:schemeClr>
+            </a:lnRef>
+            <a:fillRef idx="1">
+              <a:schemeClr val="accent2"/>
+            </a:fillRef>
+            <a:effectRef idx="0">
+              <a:schemeClr val="accent2"/>
+            </a:effectRef>
+            <a:fontRef idx="minor">
+              <a:schemeClr val="lt1"/>
+            </a:fontRef>
+          </p:style>
+          <p:txBody>
+            <a:bodyPr rtlCol="0" anchor="ctr"/>
+            <a:lstStyle/>
+            <a:p>
+              <a:pPr algn="ctr"/>
+              <a:r>
+                <a:rPr lang="en-US" sz="1400" dirty="0"/>
+                <a:t>Waypoints</a:t>
+              </a:r>
+              <a:endParaRPr lang="en-US" sz="2400" dirty="0"/>
+            </a:p>
+          </p:txBody>
+        </p:sp>
+        <p:sp>
+          <p:nvSpPr>
+            <p:cNvPr id="36" name="Rounded Rectangle 35">
+              <a:extLst>
+                <a:ext uri="{FF2B5EF4-FFF2-40B4-BE49-F238E27FC236}">
+                  <a16:creationId xmlns:a16="http://schemas.microsoft.com/office/drawing/2014/main" id="{3A368D8C-A088-A547-BE9A-2DA870CA71BE}"/>
+                </a:ext>
+              </a:extLst>
+            </p:cNvPr>
+            <p:cNvSpPr/>
+            <p:nvPr/>
+          </p:nvSpPr>
+          <p:spPr>
+            <a:xfrm>
+              <a:off x="5236538" y="1922430"/>
+              <a:ext cx="1262718" cy="785876"/>
+            </a:xfrm>
+            <a:prstGeom prst="roundRect">
+              <a:avLst/>
+            </a:prstGeom>
+          </p:spPr>
+          <p:style>
+            <a:lnRef idx="2">
+              <a:schemeClr val="accent2">
+                <a:shade val="50000"/>
+              </a:schemeClr>
+            </a:lnRef>
+            <a:fillRef idx="1">
+              <a:schemeClr val="accent2"/>
+            </a:fillRef>
+            <a:effectRef idx="0">
+              <a:schemeClr val="accent2"/>
+            </a:effectRef>
+            <a:fontRef idx="minor">
+              <a:schemeClr val="lt1"/>
+            </a:fontRef>
+          </p:style>
+          <p:txBody>
+            <a:bodyPr rtlCol="0" anchor="ctr"/>
+            <a:lstStyle/>
+            <a:p>
+              <a:pPr algn="ctr"/>
+              <a:r>
+                <a:rPr lang="en-US" sz="1400" dirty="0"/>
+                <a:t>Evaluation</a:t>
+              </a:r>
+              <a:endParaRPr lang="en-US" sz="2400" dirty="0"/>
+            </a:p>
+          </p:txBody>
+        </p:sp>
+        <p:sp>
+          <p:nvSpPr>
+            <p:cNvPr id="38" name="Rounded Rectangle 37">
+              <a:extLst>
+                <a:ext uri="{FF2B5EF4-FFF2-40B4-BE49-F238E27FC236}">
+                  <a16:creationId xmlns:a16="http://schemas.microsoft.com/office/drawing/2014/main" id="{51BD94AC-99FA-144B-A44D-243DE3F8E96E}"/>
+                </a:ext>
+              </a:extLst>
+            </p:cNvPr>
+            <p:cNvSpPr/>
+            <p:nvPr/>
+          </p:nvSpPr>
+          <p:spPr>
+            <a:xfrm>
+              <a:off x="201519" y="783138"/>
+              <a:ext cx="2681208" cy="2571554"/>
+            </a:xfrm>
+            <a:prstGeom prst="roundRect">
+              <a:avLst/>
+            </a:prstGeom>
+          </p:spPr>
+          <p:style>
+            <a:lnRef idx="1">
+              <a:schemeClr val="accent4"/>
+            </a:lnRef>
+            <a:fillRef idx="2">
+              <a:schemeClr val="accent4"/>
+            </a:fillRef>
+            <a:effectRef idx="1">
+              <a:schemeClr val="accent4"/>
+            </a:effectRef>
+            <a:fontRef idx="minor">
+              <a:schemeClr val="dk1"/>
+            </a:fontRef>
+          </p:style>
+          <p:txBody>
+            <a:bodyPr rtlCol="0" anchor="ctr"/>
+            <a:lstStyle/>
+            <a:p>
+              <a:pPr algn="ctr"/>
+              <a:endParaRPr lang="en-US" sz="2400" dirty="0"/>
+            </a:p>
+          </p:txBody>
+        </p:sp>
+        <p:sp>
+          <p:nvSpPr>
+            <p:cNvPr id="39" name="Rounded Rectangle 38">
+              <a:extLst>
+                <a:ext uri="{FF2B5EF4-FFF2-40B4-BE49-F238E27FC236}">
+                  <a16:creationId xmlns:a16="http://schemas.microsoft.com/office/drawing/2014/main" id="{7E68D474-EB90-C949-A88D-85CD0070E0C9}"/>
+                </a:ext>
+              </a:extLst>
+            </p:cNvPr>
+            <p:cNvSpPr/>
+            <p:nvPr/>
+          </p:nvSpPr>
+          <p:spPr>
+            <a:xfrm>
+              <a:off x="1727651" y="951925"/>
+              <a:ext cx="777329" cy="785876"/>
+            </a:xfrm>
+            <a:prstGeom prst="roundRect">
+              <a:avLst/>
+            </a:prstGeom>
+          </p:spPr>
+          <p:style>
+            <a:lnRef idx="2">
+              <a:schemeClr val="accent2">
+                <a:shade val="50000"/>
+              </a:schemeClr>
+            </a:lnRef>
+            <a:fillRef idx="1">
+              <a:schemeClr val="accent2"/>
+            </a:fillRef>
+            <a:effectRef idx="0">
+              <a:schemeClr val="accent2"/>
+            </a:effectRef>
+            <a:fontRef idx="minor">
+              <a:schemeClr val="lt1"/>
+            </a:fontRef>
+          </p:style>
+          <p:txBody>
+            <a:bodyPr rtlCol="0" anchor="ctr"/>
+            <a:lstStyle/>
+            <a:p>
+              <a:pPr algn="ctr"/>
+              <a:r>
+                <a:rPr lang="en-US" sz="1400" dirty="0"/>
+                <a:t>Ego Car</a:t>
+              </a:r>
+              <a:endParaRPr lang="en-US" sz="2400" dirty="0"/>
+            </a:p>
+          </p:txBody>
+        </p:sp>
+        <p:sp>
+          <p:nvSpPr>
+            <p:cNvPr id="40" name="Rounded Rectangle 39">
+              <a:extLst>
+                <a:ext uri="{FF2B5EF4-FFF2-40B4-BE49-F238E27FC236}">
+                  <a16:creationId xmlns:a16="http://schemas.microsoft.com/office/drawing/2014/main" id="{E1799A40-9E6B-7148-9B80-FCCF6DAC1B54}"/>
+                </a:ext>
+              </a:extLst>
+            </p:cNvPr>
+            <p:cNvSpPr/>
+            <p:nvPr/>
+          </p:nvSpPr>
+          <p:spPr>
+            <a:xfrm>
+              <a:off x="454333" y="2131122"/>
+              <a:ext cx="1016747" cy="785876"/>
+            </a:xfrm>
+            <a:prstGeom prst="roundRect">
+              <a:avLst/>
+            </a:prstGeom>
+          </p:spPr>
+          <p:style>
+            <a:lnRef idx="2">
+              <a:schemeClr val="accent2">
+                <a:shade val="50000"/>
+              </a:schemeClr>
+            </a:lnRef>
+            <a:fillRef idx="1">
+              <a:schemeClr val="accent2"/>
+            </a:fillRef>
+            <a:effectRef idx="0">
+              <a:schemeClr val="accent2"/>
+            </a:effectRef>
+            <a:fontRef idx="minor">
+              <a:schemeClr val="lt1"/>
+            </a:fontRef>
+          </p:style>
+          <p:txBody>
+            <a:bodyPr rtlCol="0" anchor="ctr"/>
+            <a:lstStyle/>
+            <a:p>
+              <a:pPr algn="ctr"/>
+              <a:r>
+                <a:rPr lang="en-US" sz="1400" dirty="0"/>
+                <a:t>Obstacles</a:t>
+              </a:r>
+              <a:endParaRPr lang="en-US" sz="2400" dirty="0"/>
+            </a:p>
+          </p:txBody>
+        </p:sp>
+        <p:sp>
+          <p:nvSpPr>
+            <p:cNvPr id="41" name="Rounded Rectangle 40">
+              <a:extLst>
+                <a:ext uri="{FF2B5EF4-FFF2-40B4-BE49-F238E27FC236}">
+                  <a16:creationId xmlns:a16="http://schemas.microsoft.com/office/drawing/2014/main" id="{A78017EB-3596-4046-B9AB-E82C2C886205}"/>
+                </a:ext>
+              </a:extLst>
+            </p:cNvPr>
+            <p:cNvSpPr/>
+            <p:nvPr/>
+          </p:nvSpPr>
+          <p:spPr>
+            <a:xfrm>
+              <a:off x="1723894" y="2131122"/>
+              <a:ext cx="777329" cy="785876"/>
+            </a:xfrm>
+            <a:prstGeom prst="roundRect">
+              <a:avLst/>
+            </a:prstGeom>
+          </p:spPr>
+          <p:style>
+            <a:lnRef idx="2">
+              <a:schemeClr val="accent2">
+                <a:shade val="50000"/>
+              </a:schemeClr>
+            </a:lnRef>
+            <a:fillRef idx="1">
+              <a:schemeClr val="accent2"/>
+            </a:fillRef>
+            <a:effectRef idx="0">
+              <a:schemeClr val="accent2"/>
+            </a:effectRef>
+            <a:fontRef idx="minor">
+              <a:schemeClr val="lt1"/>
+            </a:fontRef>
+          </p:style>
+          <p:txBody>
+            <a:bodyPr rtlCol="0" anchor="ctr"/>
+            <a:lstStyle/>
+            <a:p>
+              <a:pPr algn="ctr"/>
+              <a:r>
+                <a:rPr lang="en-US" sz="1400" dirty="0"/>
+                <a:t>Race track</a:t>
+              </a:r>
+              <a:endParaRPr lang="en-US" sz="2400" dirty="0"/>
+            </a:p>
+          </p:txBody>
+        </p:sp>
+        <p:cxnSp>
+          <p:nvCxnSpPr>
+            <p:cNvPr id="46" name="Elbow Connector 45">
+              <a:extLst>
+                <a:ext uri="{FF2B5EF4-FFF2-40B4-BE49-F238E27FC236}">
+                  <a16:creationId xmlns:a16="http://schemas.microsoft.com/office/drawing/2014/main" id="{37D187A5-478E-CE46-A6DB-FB291AEB4BA4}"/>
+                </a:ext>
+              </a:extLst>
+            </p:cNvPr>
+            <p:cNvCxnSpPr>
+              <a:cxnSpLocks/>
+              <a:stCxn id="34" idx="3"/>
+            </p:cNvCxnSpPr>
+            <p:nvPr/>
+          </p:nvCxnSpPr>
+          <p:spPr>
+            <a:xfrm flipH="1" flipV="1">
+              <a:off x="2501223" y="1153489"/>
+              <a:ext cx="5548053" cy="1978423"/>
+            </a:xfrm>
+            <a:prstGeom prst="bentConnector3">
+              <a:avLst>
+                <a:gd name="adj1" fmla="val -4120"/>
+              </a:avLst>
+            </a:prstGeom>
+            <a:ln>
+              <a:tailEnd type="triangle"/>
+            </a:ln>
+          </p:spPr>
+          <p:style>
+            <a:lnRef idx="2">
+              <a:schemeClr val="dk1"/>
+            </a:lnRef>
+            <a:fillRef idx="0">
+              <a:schemeClr val="dk1"/>
+            </a:fillRef>
+            <a:effectRef idx="1">
+              <a:schemeClr val="dk1"/>
+            </a:effectRef>
+            <a:fontRef idx="minor">
+              <a:schemeClr val="tx1"/>
+            </a:fontRef>
+          </p:style>
+        </p:cxnSp>
+        <p:cxnSp>
+          <p:nvCxnSpPr>
+            <p:cNvPr id="52" name="Straight Arrow Connector 51">
+              <a:extLst>
+                <a:ext uri="{FF2B5EF4-FFF2-40B4-BE49-F238E27FC236}">
+                  <a16:creationId xmlns:a16="http://schemas.microsoft.com/office/drawing/2014/main" id="{642A5EDC-CD10-0D45-AA53-66F5E2062E70}"/>
+                </a:ext>
+              </a:extLst>
+            </p:cNvPr>
+            <p:cNvCxnSpPr>
+              <a:cxnSpLocks/>
+              <a:stCxn id="5" idx="3"/>
+              <a:endCxn id="4" idx="1"/>
+            </p:cNvCxnSpPr>
+            <p:nvPr/>
+          </p:nvCxnSpPr>
+          <p:spPr>
+            <a:xfrm>
+              <a:off x="2378768" y="4185380"/>
+              <a:ext cx="1432556" cy="0"/>
+            </a:xfrm>
+            <a:prstGeom prst="straightConnector1">
+              <a:avLst/>
+            </a:prstGeom>
+            <a:ln>
+              <a:tailEnd type="triangle"/>
+            </a:ln>
+          </p:spPr>
+          <p:style>
+            <a:lnRef idx="2">
+              <a:schemeClr val="dk1"/>
+            </a:lnRef>
+            <a:fillRef idx="0">
+              <a:schemeClr val="dk1"/>
+            </a:fillRef>
+            <a:effectRef idx="1">
+              <a:schemeClr val="dk1"/>
+            </a:effectRef>
+            <a:fontRef idx="minor">
+              <a:schemeClr val="tx1"/>
+            </a:fontRef>
+          </p:style>
+        </p:cxnSp>
+        <p:cxnSp>
+          <p:nvCxnSpPr>
+            <p:cNvPr id="53" name="Straight Arrow Connector 52">
+              <a:extLst>
+                <a:ext uri="{FF2B5EF4-FFF2-40B4-BE49-F238E27FC236}">
+                  <a16:creationId xmlns:a16="http://schemas.microsoft.com/office/drawing/2014/main" id="{9BAE0232-1984-5A41-ACE5-753A35D7A567}"/>
+                </a:ext>
+              </a:extLst>
+            </p:cNvPr>
+            <p:cNvCxnSpPr>
+              <a:cxnSpLocks/>
+              <a:stCxn id="4" idx="3"/>
+            </p:cNvCxnSpPr>
+            <p:nvPr/>
+          </p:nvCxnSpPr>
+          <p:spPr>
+            <a:xfrm>
+              <a:off x="5484614" y="4185380"/>
+              <a:ext cx="1096658" cy="0"/>
+            </a:xfrm>
+            <a:prstGeom prst="straightConnector1">
+              <a:avLst/>
+            </a:prstGeom>
+            <a:ln>
+              <a:tailEnd type="triangle"/>
+            </a:ln>
+          </p:spPr>
+          <p:style>
+            <a:lnRef idx="2">
+              <a:schemeClr val="dk1"/>
+            </a:lnRef>
+            <a:fillRef idx="0">
+              <a:schemeClr val="dk1"/>
+            </a:fillRef>
+            <a:effectRef idx="1">
+              <a:schemeClr val="dk1"/>
+            </a:effectRef>
+            <a:fontRef idx="minor">
+              <a:schemeClr val="tx1"/>
+            </a:fontRef>
+          </p:style>
+        </p:cxnSp>
+        <p:cxnSp>
+          <p:nvCxnSpPr>
+            <p:cNvPr id="55" name="Straight Arrow Connector 54">
+              <a:extLst>
+                <a:ext uri="{FF2B5EF4-FFF2-40B4-BE49-F238E27FC236}">
+                  <a16:creationId xmlns:a16="http://schemas.microsoft.com/office/drawing/2014/main" id="{770BC6EE-B823-5344-8F33-4E67AA7827F8}"/>
+                </a:ext>
+              </a:extLst>
+            </p:cNvPr>
+            <p:cNvCxnSpPr>
+              <a:cxnSpLocks/>
+              <a:stCxn id="6" idx="0"/>
+              <a:endCxn id="34" idx="2"/>
+            </p:cNvCxnSpPr>
+            <p:nvPr/>
+          </p:nvCxnSpPr>
+          <p:spPr>
+            <a:xfrm flipV="1">
+              <a:off x="7417917" y="3446008"/>
+              <a:ext cx="0" cy="346434"/>
+            </a:xfrm>
+            <a:prstGeom prst="straightConnector1">
+              <a:avLst/>
+            </a:prstGeom>
+            <a:ln>
+              <a:tailEnd type="triangle"/>
+            </a:ln>
+          </p:spPr>
+          <p:style>
+            <a:lnRef idx="2">
+              <a:schemeClr val="dk1"/>
+            </a:lnRef>
+            <a:fillRef idx="0">
+              <a:schemeClr val="dk1"/>
+            </a:fillRef>
+            <a:effectRef idx="1">
+              <a:schemeClr val="dk1"/>
+            </a:effectRef>
+            <a:fontRef idx="minor">
+              <a:schemeClr val="tx1"/>
+            </a:fontRef>
+          </p:style>
+        </p:cxnSp>
+        <p:cxnSp>
+          <p:nvCxnSpPr>
+            <p:cNvPr id="58" name="Elbow Connector 57">
+              <a:extLst>
+                <a:ext uri="{FF2B5EF4-FFF2-40B4-BE49-F238E27FC236}">
+                  <a16:creationId xmlns:a16="http://schemas.microsoft.com/office/drawing/2014/main" id="{B6CF5459-5F30-244C-91EF-7D88FD75FB32}"/>
+                </a:ext>
+              </a:extLst>
+            </p:cNvPr>
+            <p:cNvCxnSpPr>
+              <a:cxnSpLocks/>
+              <a:stCxn id="35" idx="2"/>
+              <a:endCxn id="4" idx="0"/>
+            </p:cNvCxnSpPr>
+            <p:nvPr/>
+          </p:nvCxnSpPr>
+          <p:spPr>
+            <a:xfrm rot="16200000" flipH="1">
+              <a:off x="3834291" y="2978764"/>
+              <a:ext cx="1084136" cy="543219"/>
+            </a:xfrm>
+            <a:prstGeom prst="bentConnector3">
+              <a:avLst>
+                <a:gd name="adj1" fmla="val 50000"/>
+              </a:avLst>
+            </a:prstGeom>
+            <a:ln>
+              <a:tailEnd type="triangle"/>
+            </a:ln>
+          </p:spPr>
+          <p:style>
+            <a:lnRef idx="2">
+              <a:schemeClr val="dk1"/>
+            </a:lnRef>
+            <a:fillRef idx="0">
+              <a:schemeClr val="dk1"/>
+            </a:fillRef>
+            <a:effectRef idx="1">
+              <a:schemeClr val="dk1"/>
+            </a:effectRef>
+            <a:fontRef idx="minor">
+              <a:schemeClr val="tx1"/>
+            </a:fontRef>
+          </p:style>
+        </p:cxnSp>
+        <p:cxnSp>
+          <p:nvCxnSpPr>
+            <p:cNvPr id="62" name="Straight Arrow Connector 61">
+              <a:extLst>
+                <a:ext uri="{FF2B5EF4-FFF2-40B4-BE49-F238E27FC236}">
+                  <a16:creationId xmlns:a16="http://schemas.microsoft.com/office/drawing/2014/main" id="{30B8A713-B1EB-7444-AE4C-777C1375CF7A}"/>
+                </a:ext>
+              </a:extLst>
+            </p:cNvPr>
+            <p:cNvCxnSpPr>
+              <a:cxnSpLocks/>
+            </p:cNvCxnSpPr>
+            <p:nvPr/>
+          </p:nvCxnSpPr>
+          <p:spPr>
+            <a:xfrm>
+              <a:off x="4729297" y="2445488"/>
+              <a:ext cx="491120" cy="0"/>
+            </a:xfrm>
+            <a:prstGeom prst="straightConnector1">
+              <a:avLst/>
+            </a:prstGeom>
+            <a:ln>
+              <a:tailEnd type="triangle"/>
+            </a:ln>
+          </p:spPr>
+          <p:style>
+            <a:lnRef idx="2">
+              <a:schemeClr val="dk1"/>
+            </a:lnRef>
+            <a:fillRef idx="0">
+              <a:schemeClr val="dk1"/>
+            </a:fillRef>
+            <a:effectRef idx="1">
+              <a:schemeClr val="dk1"/>
+            </a:effectRef>
+            <a:fontRef idx="minor">
+              <a:schemeClr val="tx1"/>
+            </a:fontRef>
+          </p:style>
+        </p:cxnSp>
+        <p:cxnSp>
+          <p:nvCxnSpPr>
+            <p:cNvPr id="65" name="Straight Arrow Connector 64">
+              <a:extLst>
+                <a:ext uri="{FF2B5EF4-FFF2-40B4-BE49-F238E27FC236}">
+                  <a16:creationId xmlns:a16="http://schemas.microsoft.com/office/drawing/2014/main" id="{293AFF34-B972-324D-9A4F-38FFBF46E9B9}"/>
+                </a:ext>
+              </a:extLst>
+            </p:cNvPr>
+            <p:cNvCxnSpPr>
+              <a:cxnSpLocks/>
+            </p:cNvCxnSpPr>
+            <p:nvPr/>
+          </p:nvCxnSpPr>
+          <p:spPr>
+            <a:xfrm flipH="1">
+              <a:off x="4729297" y="2131122"/>
+              <a:ext cx="491120" cy="0"/>
+            </a:xfrm>
+            <a:prstGeom prst="straightConnector1">
+              <a:avLst/>
+            </a:prstGeom>
+            <a:ln>
+              <a:tailEnd type="triangle"/>
+            </a:ln>
+          </p:spPr>
+          <p:style>
+            <a:lnRef idx="2">
+              <a:schemeClr val="dk1"/>
+            </a:lnRef>
+            <a:fillRef idx="0">
+              <a:schemeClr val="dk1"/>
+            </a:fillRef>
+            <a:effectRef idx="1">
+              <a:schemeClr val="dk1"/>
+            </a:effectRef>
+            <a:fontRef idx="minor">
+              <a:schemeClr val="tx1"/>
+            </a:fontRef>
+          </p:style>
+        </p:cxnSp>
+        <p:sp>
+          <p:nvSpPr>
+            <p:cNvPr id="73" name="TextBox 72">
+              <a:extLst>
+                <a:ext uri="{FF2B5EF4-FFF2-40B4-BE49-F238E27FC236}">
+                  <a16:creationId xmlns:a16="http://schemas.microsoft.com/office/drawing/2014/main" id="{0438661B-321C-9D49-89D2-2C81FDED9913}"/>
+                </a:ext>
+              </a:extLst>
+            </p:cNvPr>
+            <p:cNvSpPr txBox="1"/>
+            <p:nvPr/>
+          </p:nvSpPr>
+          <p:spPr>
+            <a:xfrm>
+              <a:off x="4193161" y="3247850"/>
+              <a:ext cx="366395" cy="276999"/>
+            </a:xfrm>
+            <a:prstGeom prst="rect">
+              <a:avLst/>
+            </a:prstGeom>
+            <a:noFill/>
+          </p:spPr>
+          <p:txBody>
+            <a:bodyPr wrap="square" rtlCol="0">
+              <a:spAutoFit/>
+            </a:bodyPr>
+            <a:lstStyle/>
+            <a:p>
+              <a:pPr algn="ctr"/>
+              <a:r>
+                <a:rPr lang="en-US" sz="1200" dirty="0">
+                  <a:latin typeface="Consolas" panose="020B0609020204030204" pitchFamily="49" charset="0"/>
+                  <a:cs typeface="Consolas" panose="020B0609020204030204" pitchFamily="49" charset="0"/>
+                </a:rPr>
+                <a:t>wp</a:t>
+              </a:r>
+            </a:p>
+          </p:txBody>
+        </p:sp>
+        <p:sp>
+          <p:nvSpPr>
+            <p:cNvPr id="74" name="TextBox 73">
+              <a:extLst>
+                <a:ext uri="{FF2B5EF4-FFF2-40B4-BE49-F238E27FC236}">
+                  <a16:creationId xmlns:a16="http://schemas.microsoft.com/office/drawing/2014/main" id="{E71C5629-0400-DF42-AAE0-6108DE2D697E}"/>
+                </a:ext>
+              </a:extLst>
+            </p:cNvPr>
+            <p:cNvSpPr txBox="1"/>
+            <p:nvPr/>
+          </p:nvSpPr>
+          <p:spPr>
+            <a:xfrm>
+              <a:off x="7417917" y="2552407"/>
+              <a:ext cx="484483" cy="276999"/>
+            </a:xfrm>
+            <a:prstGeom prst="rect">
+              <a:avLst/>
+            </a:prstGeom>
+            <a:noFill/>
+          </p:spPr>
+          <p:txBody>
+            <a:bodyPr wrap="square" rtlCol="0">
+              <a:spAutoFit/>
+            </a:bodyPr>
+            <a:lstStyle/>
+            <a:p>
+              <a:pPr algn="ctr"/>
+              <a:r>
+                <a:rPr lang="en-US" sz="1200" dirty="0">
+                  <a:latin typeface="Calibri" panose="020F0502020204030204" pitchFamily="34" charset="0"/>
+                  <a:cs typeface="Calibri" panose="020F0502020204030204" pitchFamily="34" charset="0"/>
+                </a:rPr>
+                <a:t>yes</a:t>
+              </a:r>
+            </a:p>
+          </p:txBody>
+        </p:sp>
+        <p:sp>
+          <p:nvSpPr>
+            <p:cNvPr id="78" name="Rounded Rectangle 77">
+              <a:extLst>
+                <a:ext uri="{FF2B5EF4-FFF2-40B4-BE49-F238E27FC236}">
+                  <a16:creationId xmlns:a16="http://schemas.microsoft.com/office/drawing/2014/main" id="{0E958253-3CF5-B345-B554-28DC8DA0FDF0}"/>
+                </a:ext>
+              </a:extLst>
+            </p:cNvPr>
+            <p:cNvSpPr/>
+            <p:nvPr/>
+          </p:nvSpPr>
+          <p:spPr>
+            <a:xfrm>
+              <a:off x="6964954" y="1960080"/>
+              <a:ext cx="905926" cy="563820"/>
+            </a:xfrm>
+            <a:prstGeom prst="roundRect">
+              <a:avLst/>
+            </a:prstGeom>
+          </p:spPr>
+          <p:style>
+            <a:lnRef idx="2">
+              <a:schemeClr val="accent2">
+                <a:shade val="50000"/>
+              </a:schemeClr>
+            </a:lnRef>
+            <a:fillRef idx="1">
+              <a:schemeClr val="accent2"/>
+            </a:fillRef>
+            <a:effectRef idx="0">
+              <a:schemeClr val="accent2"/>
+            </a:effectRef>
+            <a:fontRef idx="minor">
+              <a:schemeClr val="lt1"/>
+            </a:fontRef>
+          </p:style>
+          <p:txBody>
+            <a:bodyPr rtlCol="0" anchor="ctr"/>
+            <a:lstStyle/>
+            <a:p>
+              <a:pPr algn="ctr"/>
+              <a:r>
+                <a:rPr lang="en-US" sz="1400" dirty="0"/>
+                <a:t>Model</a:t>
+              </a:r>
+              <a:endParaRPr lang="en-US" sz="2400" dirty="0"/>
+            </a:p>
+          </p:txBody>
+        </p:sp>
+        <p:cxnSp>
+          <p:nvCxnSpPr>
+            <p:cNvPr id="79" name="Straight Arrow Connector 78">
+              <a:extLst>
+                <a:ext uri="{FF2B5EF4-FFF2-40B4-BE49-F238E27FC236}">
+                  <a16:creationId xmlns:a16="http://schemas.microsoft.com/office/drawing/2014/main" id="{0E28D48C-DE63-0246-BBCD-5A3C7F8535DA}"/>
+                </a:ext>
+              </a:extLst>
+            </p:cNvPr>
+            <p:cNvCxnSpPr>
+              <a:cxnSpLocks/>
+              <a:endCxn id="78" idx="2"/>
+            </p:cNvCxnSpPr>
+            <p:nvPr/>
+          </p:nvCxnSpPr>
+          <p:spPr>
+            <a:xfrm flipH="1" flipV="1">
+              <a:off x="7417917" y="2523900"/>
+              <a:ext cx="2" cy="293916"/>
+            </a:xfrm>
+            <a:prstGeom prst="straightConnector1">
+              <a:avLst/>
+            </a:prstGeom>
+            <a:ln>
+              <a:tailEnd type="triangle"/>
+            </a:ln>
+          </p:spPr>
+          <p:style>
+            <a:lnRef idx="2">
+              <a:schemeClr val="dk1"/>
+            </a:lnRef>
+            <a:fillRef idx="0">
+              <a:schemeClr val="dk1"/>
+            </a:fillRef>
+            <a:effectRef idx="1">
+              <a:schemeClr val="dk1"/>
+            </a:effectRef>
+            <a:fontRef idx="minor">
+              <a:schemeClr val="tx1"/>
+            </a:fontRef>
+          </p:style>
+        </p:cxnSp>
+        <p:sp>
+          <p:nvSpPr>
+            <p:cNvPr id="82" name="TextBox 81">
+              <a:extLst>
+                <a:ext uri="{FF2B5EF4-FFF2-40B4-BE49-F238E27FC236}">
+                  <a16:creationId xmlns:a16="http://schemas.microsoft.com/office/drawing/2014/main" id="{7851C269-45A0-704B-8BED-290827EBAA38}"/>
+                </a:ext>
+              </a:extLst>
+            </p:cNvPr>
+            <p:cNvSpPr txBox="1"/>
+            <p:nvPr/>
+          </p:nvSpPr>
+          <p:spPr>
+            <a:xfrm>
+              <a:off x="7859077" y="3120322"/>
+              <a:ext cx="484483" cy="276999"/>
+            </a:xfrm>
+            <a:prstGeom prst="rect">
+              <a:avLst/>
+            </a:prstGeom>
+            <a:noFill/>
+          </p:spPr>
+          <p:txBody>
+            <a:bodyPr wrap="square" rtlCol="0">
+              <a:spAutoFit/>
+            </a:bodyPr>
+            <a:lstStyle/>
+            <a:p>
+              <a:pPr algn="ctr"/>
+              <a:r>
+                <a:rPr lang="en-US" sz="1200" dirty="0">
+                  <a:latin typeface="Calibri" panose="020F0502020204030204" pitchFamily="34" charset="0"/>
+                  <a:cs typeface="Calibri" panose="020F0502020204030204" pitchFamily="34" charset="0"/>
+                </a:rPr>
+                <a:t>no</a:t>
+              </a:r>
+            </a:p>
+          </p:txBody>
+        </p:sp>
+        <p:cxnSp>
+          <p:nvCxnSpPr>
+            <p:cNvPr id="84" name="Elbow Connector 83">
+              <a:extLst>
+                <a:ext uri="{FF2B5EF4-FFF2-40B4-BE49-F238E27FC236}">
+                  <a16:creationId xmlns:a16="http://schemas.microsoft.com/office/drawing/2014/main" id="{7FC72F28-0138-C64A-9BF3-2C14A5EE241E}"/>
+                </a:ext>
+              </a:extLst>
+            </p:cNvPr>
+            <p:cNvCxnSpPr>
+              <a:cxnSpLocks/>
+              <a:stCxn id="78" idx="0"/>
+            </p:cNvCxnSpPr>
+            <p:nvPr/>
+          </p:nvCxnSpPr>
+          <p:spPr>
+            <a:xfrm rot="16200000" flipV="1">
+              <a:off x="4740589" y="-717248"/>
+              <a:ext cx="437963" cy="4916694"/>
+            </a:xfrm>
+            <a:prstGeom prst="bentConnector2">
+              <a:avLst/>
+            </a:prstGeom>
+            <a:ln>
+              <a:tailEnd type="triangle"/>
+            </a:ln>
+          </p:spPr>
+          <p:style>
+            <a:lnRef idx="2">
+              <a:schemeClr val="dk1"/>
+            </a:lnRef>
+            <a:fillRef idx="0">
+              <a:schemeClr val="dk1"/>
+            </a:fillRef>
+            <a:effectRef idx="1">
+              <a:schemeClr val="dk1"/>
+            </a:effectRef>
+            <a:fontRef idx="minor">
+              <a:schemeClr val="tx1"/>
+            </a:fontRef>
+          </p:style>
+        </p:cxnSp>
+        <p:cxnSp>
+          <p:nvCxnSpPr>
+            <p:cNvPr id="87" name="Straight Arrow Connector 86">
+              <a:extLst>
+                <a:ext uri="{FF2B5EF4-FFF2-40B4-BE49-F238E27FC236}">
+                  <a16:creationId xmlns:a16="http://schemas.microsoft.com/office/drawing/2014/main" id="{C0EA64F9-F37F-1047-82BF-775826A470D5}"/>
+                </a:ext>
+              </a:extLst>
+            </p:cNvPr>
+            <p:cNvCxnSpPr>
+              <a:cxnSpLocks/>
+              <a:stCxn id="38" idx="2"/>
+              <a:endCxn id="5" idx="0"/>
+            </p:cNvCxnSpPr>
+            <p:nvPr/>
+          </p:nvCxnSpPr>
+          <p:spPr>
+            <a:xfrm>
+              <a:off x="1542123" y="3354692"/>
+              <a:ext cx="0" cy="437750"/>
+            </a:xfrm>
+            <a:prstGeom prst="straightConnector1">
+              <a:avLst/>
+            </a:prstGeom>
+            <a:ln>
+              <a:tailEnd type="triangle"/>
+            </a:ln>
+          </p:spPr>
+          <p:style>
+            <a:lnRef idx="2">
+              <a:schemeClr val="dk1"/>
+            </a:lnRef>
+            <a:fillRef idx="0">
+              <a:schemeClr val="dk1"/>
+            </a:fillRef>
+            <a:effectRef idx="1">
+              <a:schemeClr val="dk1"/>
+            </a:effectRef>
+            <a:fontRef idx="minor">
+              <a:schemeClr val="tx1"/>
+            </a:fontRef>
+          </p:style>
+        </p:cxnSp>
+        <p:sp>
+          <p:nvSpPr>
+            <p:cNvPr id="90" name="TextBox 89">
+              <a:extLst>
+                <a:ext uri="{FF2B5EF4-FFF2-40B4-BE49-F238E27FC236}">
+                  <a16:creationId xmlns:a16="http://schemas.microsoft.com/office/drawing/2014/main" id="{B38BE75D-71BE-1144-9B4F-ABB940F8FE67}"/>
+                </a:ext>
+              </a:extLst>
+            </p:cNvPr>
+            <p:cNvSpPr txBox="1"/>
+            <p:nvPr/>
+          </p:nvSpPr>
+          <p:spPr>
+            <a:xfrm>
+              <a:off x="449822" y="1136682"/>
+              <a:ext cx="983727" cy="523220"/>
+            </a:xfrm>
+            <a:prstGeom prst="rect">
+              <a:avLst/>
+            </a:prstGeom>
+            <a:noFill/>
+          </p:spPr>
+          <p:txBody>
+            <a:bodyPr wrap="square" rtlCol="0">
+              <a:spAutoFit/>
+            </a:bodyPr>
+            <a:lstStyle/>
+            <a:p>
+              <a:pPr algn="ctr"/>
+              <a:r>
+                <a:rPr lang="en-US" sz="1400" dirty="0">
+                  <a:latin typeface="Calibri" panose="020F0502020204030204" pitchFamily="34" charset="0"/>
+                  <a:cs typeface="Calibri" panose="020F0502020204030204" pitchFamily="34" charset="0"/>
+                </a:rPr>
+                <a:t>CARLA Simulator</a:t>
+              </a:r>
+            </a:p>
+          </p:txBody>
+        </p:sp>
+        <p:sp>
+          <p:nvSpPr>
+            <p:cNvPr id="91" name="TextBox 90">
+              <a:extLst>
+                <a:ext uri="{FF2B5EF4-FFF2-40B4-BE49-F238E27FC236}">
+                  <a16:creationId xmlns:a16="http://schemas.microsoft.com/office/drawing/2014/main" id="{9CCAD251-C543-E948-9A51-6E4192468D50}"/>
+                </a:ext>
+              </a:extLst>
+            </p:cNvPr>
+            <p:cNvSpPr txBox="1"/>
+            <p:nvPr/>
+          </p:nvSpPr>
+          <p:spPr>
+            <a:xfrm>
+              <a:off x="607756" y="3431237"/>
+              <a:ext cx="983727" cy="276999"/>
+            </a:xfrm>
+            <a:prstGeom prst="rect">
+              <a:avLst/>
+            </a:prstGeom>
+            <a:noFill/>
+          </p:spPr>
+          <p:txBody>
+            <a:bodyPr wrap="square" rtlCol="0">
+              <a:spAutoFit/>
+            </a:bodyPr>
+            <a:lstStyle/>
+            <a:p>
+              <a:pPr algn="ctr"/>
+              <a:r>
+                <a:rPr lang="en-US" sz="1200" dirty="0">
+                  <a:latin typeface="Calibri" panose="020F0502020204030204" pitchFamily="34" charset="0"/>
+                  <a:cs typeface="Calibri" panose="020F0502020204030204" pitchFamily="34" charset="0"/>
+                </a:rPr>
+                <a:t>CARLA data</a:t>
+              </a:r>
+            </a:p>
+          </p:txBody>
+        </p:sp>
+      </p:grpSp>
+    </p:spTree>
+    <p:extLst>
+      <p:ext uri="{BB962C8B-B14F-4D97-AF65-F5344CB8AC3E}">
+        <p14:creationId xmlns:p14="http://schemas.microsoft.com/office/powerpoint/2010/main" val="1002303181"/>
       </p:ext>
     </p:extLst>
   </p:cSld>

</xml_diff>